<commit_message>
finalizada logica de 1a ordem
</commit_message>
<xml_diff>
--- a/8º Período/Inteligência Artificial/Lógica de Primeira Ordem.pptx
+++ b/8º Período/Inteligência Artificial/Lógica de Primeira Ordem.pptx
@@ -5,7 +5,7 @@
     <p:sldMasterId id="2147483648" r:id="rId1"/>
   </p:sldMasterIdLst>
   <p:notesMasterIdLst>
-    <p:notesMasterId r:id="rId24"/>
+    <p:notesMasterId r:id="rId29"/>
   </p:notesMasterIdLst>
   <p:sldIdLst>
     <p:sldId id="256" r:id="rId2"/>
@@ -30,6 +30,11 @@
     <p:sldId id="275" r:id="rId21"/>
     <p:sldId id="276" r:id="rId22"/>
     <p:sldId id="277" r:id="rId23"/>
+    <p:sldId id="278" r:id="rId24"/>
+    <p:sldId id="279" r:id="rId25"/>
+    <p:sldId id="280" r:id="rId26"/>
+    <p:sldId id="281" r:id="rId27"/>
+    <p:sldId id="282" r:id="rId28"/>
   </p:sldIdLst>
   <p:sldSz cx="12192000" cy="6858000"/>
   <p:notesSz cx="6858000" cy="9144000"/>
@@ -128,6 +133,11 @@
       </a:defRPr>
     </a:lvl9pPr>
   </p:defaultTextStyle>
+  <p:extLst>
+    <p:ext uri="{EFAFB233-063F-42B5-8137-9DF3F51BA10A}">
+      <p15:sldGuideLst xmlns:p15="http://schemas.microsoft.com/office/powerpoint/2012/main"/>
+    </p:ext>
+  </p:extLst>
 </p:presentation>
 </file>
 
@@ -213,7 +223,7 @@
           <a:p>
             <a:fld id="{B50EB9DC-2465-4A46-A3E8-C20DE0E4299B}" type="datetimeFigureOut">
               <a:rPr lang="pt-BR" smtClean="0"/>
-              <a:t>10/11/2018</a:t>
+              <a:t>11/11/2018</a:t>
             </a:fld>
             <a:endParaRPr lang="pt-BR"/>
           </a:p>
@@ -480,6 +490,199 @@
 </p:notesMaster>
 </file>
 
+<file path=ppt/notesSlides/notesSlide1.xml><?xml version="1.0" encoding="utf-8"?>
+<p:notes xmlns:a="http://schemas.openxmlformats.org/drawingml/2006/main" xmlns:r="http://schemas.openxmlformats.org/officeDocument/2006/relationships" xmlns:p="http://schemas.openxmlformats.org/presentationml/2006/main">
+  <p:cSld>
+    <p:spTree>
+      <p:nvGrpSpPr>
+        <p:cNvPr id="1" name=""/>
+        <p:cNvGrpSpPr/>
+        <p:nvPr/>
+      </p:nvGrpSpPr>
+      <p:grpSpPr>
+        <a:xfrm>
+          <a:off x="0" y="0"/>
+          <a:ext cx="0" cy="0"/>
+          <a:chOff x="0" y="0"/>
+          <a:chExt cx="0" cy="0"/>
+        </a:xfrm>
+      </p:grpSpPr>
+      <p:sp>
+        <p:nvSpPr>
+          <p:cNvPr id="2" name="Espaço Reservado para Imagem de Slide 1"/>
+          <p:cNvSpPr>
+            <a:spLocks noGrp="1" noRot="1" noChangeAspect="1"/>
+          </p:cNvSpPr>
+          <p:nvPr>
+            <p:ph type="sldImg"/>
+          </p:nvPr>
+        </p:nvSpPr>
+        <p:spPr/>
+      </p:sp>
+      <p:sp>
+        <p:nvSpPr>
+          <p:cNvPr id="3" name="Espaço Reservado para Anotações 2"/>
+          <p:cNvSpPr>
+            <a:spLocks noGrp="1"/>
+          </p:cNvSpPr>
+          <p:nvPr>
+            <p:ph type="body" idx="1"/>
+          </p:nvPr>
+        </p:nvSpPr>
+        <p:spPr/>
+        <p:txBody>
+          <a:bodyPr/>
+          <a:lstStyle/>
+          <a:p>
+            <a:endParaRPr lang="pt-BR" dirty="0"/>
+          </a:p>
+        </p:txBody>
+      </p:sp>
+      <p:sp>
+        <p:nvSpPr>
+          <p:cNvPr id="4" name="Espaço Reservado para Número de Slide 3"/>
+          <p:cNvSpPr>
+            <a:spLocks noGrp="1"/>
+          </p:cNvSpPr>
+          <p:nvPr>
+            <p:ph type="sldNum" sz="quarter" idx="5"/>
+          </p:nvPr>
+        </p:nvSpPr>
+        <p:spPr/>
+        <p:txBody>
+          <a:bodyPr/>
+          <a:lstStyle/>
+          <a:p>
+            <a:fld id="{A67CC5EB-F7BD-4B84-A606-ED0254E481A6}" type="slidenum">
+              <a:rPr lang="pt-BR" smtClean="0"/>
+              <a:t>26</a:t>
+            </a:fld>
+            <a:endParaRPr lang="pt-BR"/>
+          </a:p>
+        </p:txBody>
+      </p:sp>
+    </p:spTree>
+    <p:extLst>
+      <p:ext uri="{BB962C8B-B14F-4D97-AF65-F5344CB8AC3E}">
+        <p14:creationId xmlns:p14="http://schemas.microsoft.com/office/powerpoint/2010/main" val="3780086172"/>
+      </p:ext>
+    </p:extLst>
+  </p:cSld>
+  <p:clrMapOvr>
+    <a:masterClrMapping/>
+  </p:clrMapOvr>
+</p:notes>
+</file>
+
+<file path=ppt/notesSlides/notesSlide2.xml><?xml version="1.0" encoding="utf-8"?>
+<p:notes xmlns:a="http://schemas.openxmlformats.org/drawingml/2006/main" xmlns:r="http://schemas.openxmlformats.org/officeDocument/2006/relationships" xmlns:p="http://schemas.openxmlformats.org/presentationml/2006/main" showMasterSp="0" showMasterPhAnim="0">
+  <p:cSld>
+    <p:spTree>
+      <p:nvGrpSpPr>
+        <p:cNvPr id="1" name="Shape 96"/>
+        <p:cNvGrpSpPr/>
+        <p:nvPr/>
+      </p:nvGrpSpPr>
+      <p:grpSpPr>
+        <a:xfrm>
+          <a:off x="0" y="0"/>
+          <a:ext cx="0" cy="0"/>
+          <a:chOff x="0" y="0"/>
+          <a:chExt cx="0" cy="0"/>
+        </a:xfrm>
+      </p:grpSpPr>
+      <p:sp>
+        <p:nvSpPr>
+          <p:cNvPr id="97" name="Shape 97"/>
+          <p:cNvSpPr>
+            <a:spLocks noGrp="1" noRot="1" noChangeAspect="1"/>
+          </p:cNvSpPr>
+          <p:nvPr>
+            <p:ph type="sldImg" idx="2"/>
+          </p:nvPr>
+        </p:nvSpPr>
+        <p:spPr>
+          <a:xfrm>
+            <a:off x="381000" y="685800"/>
+            <a:ext cx="6096000" cy="3429000"/>
+          </a:xfrm>
+          <a:custGeom>
+            <a:avLst/>
+            <a:gdLst/>
+            <a:ahLst/>
+            <a:cxnLst/>
+            <a:rect l="0" t="0" r="0" b="0"/>
+            <a:pathLst>
+              <a:path w="120000" h="120000" extrusionOk="0">
+                <a:moveTo>
+                  <a:pt x="0" y="0"/>
+                </a:moveTo>
+                <a:lnTo>
+                  <a:pt x="120000" y="0"/>
+                </a:lnTo>
+                <a:lnTo>
+                  <a:pt x="120000" y="120000"/>
+                </a:lnTo>
+                <a:lnTo>
+                  <a:pt x="0" y="120000"/>
+                </a:lnTo>
+                <a:close/>
+              </a:path>
+            </a:pathLst>
+          </a:custGeom>
+        </p:spPr>
+      </p:sp>
+      <p:sp>
+        <p:nvSpPr>
+          <p:cNvPr id="98" name="Shape 98"/>
+          <p:cNvSpPr txBox="1">
+            <a:spLocks noGrp="1"/>
+          </p:cNvSpPr>
+          <p:nvPr>
+            <p:ph type="body" idx="1"/>
+          </p:nvPr>
+        </p:nvSpPr>
+        <p:spPr>
+          <a:xfrm>
+            <a:off x="685800" y="4343400"/>
+            <a:ext cx="5486400" cy="4114800"/>
+          </a:xfrm>
+          <a:prstGeom prst="rect">
+            <a:avLst/>
+          </a:prstGeom>
+        </p:spPr>
+        <p:txBody>
+          <a:bodyPr spcFirstLastPara="1" wrap="square" lIns="91425" tIns="91425" rIns="91425" bIns="91425" anchor="t" anchorCtr="0">
+            <a:noAutofit/>
+          </a:bodyPr>
+          <a:lstStyle/>
+          <a:p>
+            <a:pPr marL="0" lvl="0" indent="0">
+              <a:spcBef>
+                <a:spcPts val="0"/>
+              </a:spcBef>
+              <a:spcAft>
+                <a:spcPts val="0"/>
+              </a:spcAft>
+              <a:buNone/>
+            </a:pPr>
+            <a:endParaRPr/>
+          </a:p>
+        </p:txBody>
+      </p:sp>
+    </p:spTree>
+    <p:extLst>
+      <p:ext uri="{BB962C8B-B14F-4D97-AF65-F5344CB8AC3E}">
+        <p14:creationId xmlns:p14="http://schemas.microsoft.com/office/powerpoint/2010/main" val="1179626694"/>
+      </p:ext>
+    </p:extLst>
+  </p:cSld>
+  <p:clrMapOvr>
+    <a:masterClrMapping/>
+  </p:clrMapOvr>
+</p:notes>
+</file>
+
 <file path=ppt/slideLayouts/slideLayout1.xml><?xml version="1.0" encoding="utf-8"?>
 <p:sldLayout xmlns:a="http://schemas.openxmlformats.org/drawingml/2006/main" xmlns:r="http://schemas.openxmlformats.org/officeDocument/2006/relationships" xmlns:p="http://schemas.openxmlformats.org/presentationml/2006/main" type="title" preserve="1">
   <p:cSld name="Slide de Título">
@@ -627,7 +830,7 @@
           <a:p>
             <a:fld id="{D2B84CA4-9C03-4D6D-B6AF-664DA4EE0AC5}" type="datetimeFigureOut">
               <a:rPr lang="pt-BR" smtClean="0"/>
-              <a:t>10/11/2018</a:t>
+              <a:t>11/11/2018</a:t>
             </a:fld>
             <a:endParaRPr lang="pt-BR"/>
           </a:p>
@@ -825,7 +1028,7 @@
           <a:p>
             <a:fld id="{D2B84CA4-9C03-4D6D-B6AF-664DA4EE0AC5}" type="datetimeFigureOut">
               <a:rPr lang="pt-BR" smtClean="0"/>
-              <a:t>10/11/2018</a:t>
+              <a:t>11/11/2018</a:t>
             </a:fld>
             <a:endParaRPr lang="pt-BR"/>
           </a:p>
@@ -1033,7 +1236,7 @@
           <a:p>
             <a:fld id="{D2B84CA4-9C03-4D6D-B6AF-664DA4EE0AC5}" type="datetimeFigureOut">
               <a:rPr lang="pt-BR" smtClean="0"/>
-              <a:t>10/11/2018</a:t>
+              <a:t>11/11/2018</a:t>
             </a:fld>
             <a:endParaRPr lang="pt-BR"/>
           </a:p>
@@ -1097,6 +1300,361 @@
     <p:extLst>
       <p:ext uri="{BB962C8B-B14F-4D97-AF65-F5344CB8AC3E}">
         <p14:creationId xmlns:p14="http://schemas.microsoft.com/office/powerpoint/2010/main" val="3751372762"/>
+      </p:ext>
+    </p:extLst>
+  </p:cSld>
+  <p:clrMapOvr>
+    <a:masterClrMapping/>
+  </p:clrMapOvr>
+</p:sldLayout>
+</file>
+
+<file path=ppt/slideLayouts/slideLayout12.xml><?xml version="1.0" encoding="utf-8"?>
+<p:sldLayout xmlns:a="http://schemas.openxmlformats.org/drawingml/2006/main" xmlns:r="http://schemas.openxmlformats.org/officeDocument/2006/relationships" xmlns:p="http://schemas.openxmlformats.org/presentationml/2006/main" matchingName="Title and body" type="tx">
+  <p:cSld name="Title and body">
+    <p:spTree>
+      <p:nvGrpSpPr>
+        <p:cNvPr id="1" name="Shape 16"/>
+        <p:cNvGrpSpPr/>
+        <p:nvPr/>
+      </p:nvGrpSpPr>
+      <p:grpSpPr>
+        <a:xfrm>
+          <a:off x="0" y="0"/>
+          <a:ext cx="0" cy="0"/>
+          <a:chOff x="0" y="0"/>
+          <a:chExt cx="0" cy="0"/>
+        </a:xfrm>
+      </p:grpSpPr>
+      <p:sp>
+        <p:nvSpPr>
+          <p:cNvPr id="17" name="Google Shape;17;p4"/>
+          <p:cNvSpPr txBox="1">
+            <a:spLocks noGrp="1"/>
+          </p:cNvSpPr>
+          <p:nvPr>
+            <p:ph type="title"/>
+          </p:nvPr>
+        </p:nvSpPr>
+        <p:spPr>
+          <a:xfrm>
+            <a:off x="415600" y="593367"/>
+            <a:ext cx="11360800" cy="763600"/>
+          </a:xfrm>
+          <a:prstGeom prst="rect">
+            <a:avLst/>
+          </a:prstGeom>
+        </p:spPr>
+        <p:txBody>
+          <a:bodyPr spcFirstLastPara="1" wrap="square" lIns="91425" tIns="91425" rIns="91425" bIns="91425" anchor="t" anchorCtr="0"/>
+          <a:lstStyle>
+            <a:lvl1pPr lvl="0">
+              <a:spcBef>
+                <a:spcPts val="0"/>
+              </a:spcBef>
+              <a:spcAft>
+                <a:spcPts val="0"/>
+              </a:spcAft>
+              <a:buSzPts val="2800"/>
+              <a:buNone/>
+              <a:defRPr/>
+            </a:lvl1pPr>
+            <a:lvl2pPr lvl="1">
+              <a:spcBef>
+                <a:spcPts val="0"/>
+              </a:spcBef>
+              <a:spcAft>
+                <a:spcPts val="0"/>
+              </a:spcAft>
+              <a:buSzPts val="2800"/>
+              <a:buNone/>
+              <a:defRPr/>
+            </a:lvl2pPr>
+            <a:lvl3pPr lvl="2">
+              <a:spcBef>
+                <a:spcPts val="0"/>
+              </a:spcBef>
+              <a:spcAft>
+                <a:spcPts val="0"/>
+              </a:spcAft>
+              <a:buSzPts val="2800"/>
+              <a:buNone/>
+              <a:defRPr/>
+            </a:lvl3pPr>
+            <a:lvl4pPr lvl="3">
+              <a:spcBef>
+                <a:spcPts val="0"/>
+              </a:spcBef>
+              <a:spcAft>
+                <a:spcPts val="0"/>
+              </a:spcAft>
+              <a:buSzPts val="2800"/>
+              <a:buNone/>
+              <a:defRPr/>
+            </a:lvl4pPr>
+            <a:lvl5pPr lvl="4">
+              <a:spcBef>
+                <a:spcPts val="0"/>
+              </a:spcBef>
+              <a:spcAft>
+                <a:spcPts val="0"/>
+              </a:spcAft>
+              <a:buSzPts val="2800"/>
+              <a:buNone/>
+              <a:defRPr/>
+            </a:lvl5pPr>
+            <a:lvl6pPr lvl="5">
+              <a:spcBef>
+                <a:spcPts val="0"/>
+              </a:spcBef>
+              <a:spcAft>
+                <a:spcPts val="0"/>
+              </a:spcAft>
+              <a:buSzPts val="2800"/>
+              <a:buNone/>
+              <a:defRPr/>
+            </a:lvl6pPr>
+            <a:lvl7pPr lvl="6">
+              <a:spcBef>
+                <a:spcPts val="0"/>
+              </a:spcBef>
+              <a:spcAft>
+                <a:spcPts val="0"/>
+              </a:spcAft>
+              <a:buSzPts val="2800"/>
+              <a:buNone/>
+              <a:defRPr/>
+            </a:lvl7pPr>
+            <a:lvl8pPr lvl="7">
+              <a:spcBef>
+                <a:spcPts val="0"/>
+              </a:spcBef>
+              <a:spcAft>
+                <a:spcPts val="0"/>
+              </a:spcAft>
+              <a:buSzPts val="2800"/>
+              <a:buNone/>
+              <a:defRPr/>
+            </a:lvl8pPr>
+            <a:lvl9pPr lvl="8">
+              <a:spcBef>
+                <a:spcPts val="0"/>
+              </a:spcBef>
+              <a:spcAft>
+                <a:spcPts val="0"/>
+              </a:spcAft>
+              <a:buSzPts val="2800"/>
+              <a:buNone/>
+              <a:defRPr/>
+            </a:lvl9pPr>
+          </a:lstStyle>
+          <a:p>
+            <a:endParaRPr/>
+          </a:p>
+        </p:txBody>
+      </p:sp>
+      <p:sp>
+        <p:nvSpPr>
+          <p:cNvPr id="18" name="Google Shape;18;p4"/>
+          <p:cNvSpPr txBox="1">
+            <a:spLocks noGrp="1"/>
+          </p:cNvSpPr>
+          <p:nvPr>
+            <p:ph type="body" idx="1"/>
+          </p:nvPr>
+        </p:nvSpPr>
+        <p:spPr>
+          <a:xfrm>
+            <a:off x="415600" y="1536633"/>
+            <a:ext cx="11360800" cy="4555200"/>
+          </a:xfrm>
+          <a:prstGeom prst="rect">
+            <a:avLst/>
+          </a:prstGeom>
+        </p:spPr>
+        <p:txBody>
+          <a:bodyPr spcFirstLastPara="1" wrap="square" lIns="91425" tIns="91425" rIns="91425" bIns="91425" anchor="t" anchorCtr="0"/>
+          <a:lstStyle>
+            <a:lvl1pPr marL="609585" lvl="0" indent="-457189">
+              <a:spcBef>
+                <a:spcPts val="0"/>
+              </a:spcBef>
+              <a:spcAft>
+                <a:spcPts val="0"/>
+              </a:spcAft>
+              <a:buSzPts val="1800"/>
+              <a:buChar char="●"/>
+              <a:defRPr/>
+            </a:lvl1pPr>
+            <a:lvl2pPr marL="1219170" lvl="1" indent="-423323">
+              <a:spcBef>
+                <a:spcPts val="2133"/>
+              </a:spcBef>
+              <a:spcAft>
+                <a:spcPts val="0"/>
+              </a:spcAft>
+              <a:buSzPts val="1400"/>
+              <a:buChar char="○"/>
+              <a:defRPr/>
+            </a:lvl2pPr>
+            <a:lvl3pPr marL="1828754" lvl="2" indent="-423323">
+              <a:spcBef>
+                <a:spcPts val="2133"/>
+              </a:spcBef>
+              <a:spcAft>
+                <a:spcPts val="0"/>
+              </a:spcAft>
+              <a:buSzPts val="1400"/>
+              <a:buChar char="■"/>
+              <a:defRPr/>
+            </a:lvl3pPr>
+            <a:lvl4pPr marL="2438339" lvl="3" indent="-423323">
+              <a:spcBef>
+                <a:spcPts val="2133"/>
+              </a:spcBef>
+              <a:spcAft>
+                <a:spcPts val="0"/>
+              </a:spcAft>
+              <a:buSzPts val="1400"/>
+              <a:buChar char="●"/>
+              <a:defRPr/>
+            </a:lvl4pPr>
+            <a:lvl5pPr marL="3047924" lvl="4" indent="-423323">
+              <a:spcBef>
+                <a:spcPts val="2133"/>
+              </a:spcBef>
+              <a:spcAft>
+                <a:spcPts val="0"/>
+              </a:spcAft>
+              <a:buSzPts val="1400"/>
+              <a:buChar char="○"/>
+              <a:defRPr/>
+            </a:lvl5pPr>
+            <a:lvl6pPr marL="3657509" lvl="5" indent="-423323">
+              <a:spcBef>
+                <a:spcPts val="2133"/>
+              </a:spcBef>
+              <a:spcAft>
+                <a:spcPts val="0"/>
+              </a:spcAft>
+              <a:buSzPts val="1400"/>
+              <a:buChar char="■"/>
+              <a:defRPr/>
+            </a:lvl6pPr>
+            <a:lvl7pPr marL="4267093" lvl="6" indent="-423323">
+              <a:spcBef>
+                <a:spcPts val="2133"/>
+              </a:spcBef>
+              <a:spcAft>
+                <a:spcPts val="0"/>
+              </a:spcAft>
+              <a:buSzPts val="1400"/>
+              <a:buChar char="●"/>
+              <a:defRPr/>
+            </a:lvl7pPr>
+            <a:lvl8pPr marL="4876678" lvl="7" indent="-423323">
+              <a:spcBef>
+                <a:spcPts val="2133"/>
+              </a:spcBef>
+              <a:spcAft>
+                <a:spcPts val="0"/>
+              </a:spcAft>
+              <a:buSzPts val="1400"/>
+              <a:buChar char="○"/>
+              <a:defRPr/>
+            </a:lvl8pPr>
+            <a:lvl9pPr marL="5486263" lvl="8" indent="-423323">
+              <a:spcBef>
+                <a:spcPts val="2133"/>
+              </a:spcBef>
+              <a:spcAft>
+                <a:spcPts val="2133"/>
+              </a:spcAft>
+              <a:buSzPts val="1400"/>
+              <a:buChar char="■"/>
+              <a:defRPr/>
+            </a:lvl9pPr>
+          </a:lstStyle>
+          <a:p>
+            <a:endParaRPr/>
+          </a:p>
+        </p:txBody>
+      </p:sp>
+      <p:sp>
+        <p:nvSpPr>
+          <p:cNvPr id="19" name="Google Shape;19;p4"/>
+          <p:cNvSpPr txBox="1">
+            <a:spLocks noGrp="1"/>
+          </p:cNvSpPr>
+          <p:nvPr>
+            <p:ph type="sldNum" idx="12"/>
+          </p:nvPr>
+        </p:nvSpPr>
+        <p:spPr>
+          <a:xfrm>
+            <a:off x="11296611" y="6217623"/>
+            <a:ext cx="731600" cy="524800"/>
+          </a:xfrm>
+          <a:prstGeom prst="rect">
+            <a:avLst/>
+          </a:prstGeom>
+        </p:spPr>
+        <p:txBody>
+          <a:bodyPr spcFirstLastPara="1" wrap="square" lIns="91425" tIns="91425" rIns="91425" bIns="91425" anchor="ctr" anchorCtr="0">
+            <a:noAutofit/>
+          </a:bodyPr>
+          <a:lstStyle>
+            <a:lvl1pPr lvl="0">
+              <a:buNone/>
+              <a:defRPr/>
+            </a:lvl1pPr>
+            <a:lvl2pPr lvl="1">
+              <a:buNone/>
+              <a:defRPr/>
+            </a:lvl2pPr>
+            <a:lvl3pPr lvl="2">
+              <a:buNone/>
+              <a:defRPr/>
+            </a:lvl3pPr>
+            <a:lvl4pPr lvl="3">
+              <a:buNone/>
+              <a:defRPr/>
+            </a:lvl4pPr>
+            <a:lvl5pPr lvl="4">
+              <a:buNone/>
+              <a:defRPr/>
+            </a:lvl5pPr>
+            <a:lvl6pPr lvl="5">
+              <a:buNone/>
+              <a:defRPr/>
+            </a:lvl6pPr>
+            <a:lvl7pPr lvl="6">
+              <a:buNone/>
+              <a:defRPr/>
+            </a:lvl7pPr>
+            <a:lvl8pPr lvl="7">
+              <a:buNone/>
+              <a:defRPr/>
+            </a:lvl8pPr>
+            <a:lvl9pPr lvl="8">
+              <a:buNone/>
+              <a:defRPr/>
+            </a:lvl9pPr>
+          </a:lstStyle>
+          <a:p>
+            <a:fld id="{00000000-1234-1234-1234-123412341234}" type="slidenum">
+              <a:rPr lang="pt-BR" smtClean="0"/>
+              <a:pPr/>
+              <a:t>‹nº›</a:t>
+            </a:fld>
+            <a:endParaRPr lang="pt-BR"/>
+          </a:p>
+        </p:txBody>
+      </p:sp>
+    </p:spTree>
+    <p:extLst>
+      <p:ext uri="{BB962C8B-B14F-4D97-AF65-F5344CB8AC3E}">
+        <p14:creationId xmlns:p14="http://schemas.microsoft.com/office/powerpoint/2010/main" val="4283173398"/>
       </p:ext>
     </p:extLst>
   </p:cSld>
@@ -1231,7 +1789,7 @@
           <a:p>
             <a:fld id="{D2B84CA4-9C03-4D6D-B6AF-664DA4EE0AC5}" type="datetimeFigureOut">
               <a:rPr lang="pt-BR" smtClean="0"/>
-              <a:t>10/11/2018</a:t>
+              <a:t>11/11/2018</a:t>
             </a:fld>
             <a:endParaRPr lang="pt-BR"/>
           </a:p>
@@ -1506,7 +2064,7 @@
           <a:p>
             <a:fld id="{D2B84CA4-9C03-4D6D-B6AF-664DA4EE0AC5}" type="datetimeFigureOut">
               <a:rPr lang="pt-BR" smtClean="0"/>
-              <a:t>10/11/2018</a:t>
+              <a:t>11/11/2018</a:t>
             </a:fld>
             <a:endParaRPr lang="pt-BR"/>
           </a:p>
@@ -1771,7 +2329,7 @@
           <a:p>
             <a:fld id="{D2B84CA4-9C03-4D6D-B6AF-664DA4EE0AC5}" type="datetimeFigureOut">
               <a:rPr lang="pt-BR" smtClean="0"/>
-              <a:t>10/11/2018</a:t>
+              <a:t>11/11/2018</a:t>
             </a:fld>
             <a:endParaRPr lang="pt-BR"/>
           </a:p>
@@ -2183,7 +2741,7 @@
           <a:p>
             <a:fld id="{D2B84CA4-9C03-4D6D-B6AF-664DA4EE0AC5}" type="datetimeFigureOut">
               <a:rPr lang="pt-BR" smtClean="0"/>
-              <a:t>10/11/2018</a:t>
+              <a:t>11/11/2018</a:t>
             </a:fld>
             <a:endParaRPr lang="pt-BR"/>
           </a:p>
@@ -2324,7 +2882,7 @@
           <a:p>
             <a:fld id="{D2B84CA4-9C03-4D6D-B6AF-664DA4EE0AC5}" type="datetimeFigureOut">
               <a:rPr lang="pt-BR" smtClean="0"/>
-              <a:t>10/11/2018</a:t>
+              <a:t>11/11/2018</a:t>
             </a:fld>
             <a:endParaRPr lang="pt-BR"/>
           </a:p>
@@ -2437,7 +2995,7 @@
           <a:p>
             <a:fld id="{D2B84CA4-9C03-4D6D-B6AF-664DA4EE0AC5}" type="datetimeFigureOut">
               <a:rPr lang="pt-BR" smtClean="0"/>
-              <a:t>10/11/2018</a:t>
+              <a:t>11/11/2018</a:t>
             </a:fld>
             <a:endParaRPr lang="pt-BR"/>
           </a:p>
@@ -2748,7 +3306,7 @@
           <a:p>
             <a:fld id="{D2B84CA4-9C03-4D6D-B6AF-664DA4EE0AC5}" type="datetimeFigureOut">
               <a:rPr lang="pt-BR" smtClean="0"/>
-              <a:t>10/11/2018</a:t>
+              <a:t>11/11/2018</a:t>
             </a:fld>
             <a:endParaRPr lang="pt-BR"/>
           </a:p>
@@ -3036,7 +3594,7 @@
           <a:p>
             <a:fld id="{D2B84CA4-9C03-4D6D-B6AF-664DA4EE0AC5}" type="datetimeFigureOut">
               <a:rPr lang="pt-BR" smtClean="0"/>
-              <a:t>10/11/2018</a:t>
+              <a:t>11/11/2018</a:t>
             </a:fld>
             <a:endParaRPr lang="pt-BR"/>
           </a:p>
@@ -3277,7 +3835,7 @@
           <a:p>
             <a:fld id="{D2B84CA4-9C03-4D6D-B6AF-664DA4EE0AC5}" type="datetimeFigureOut">
               <a:rPr lang="pt-BR" smtClean="0"/>
-              <a:t>10/11/2018</a:t>
+              <a:t>11/11/2018</a:t>
             </a:fld>
             <a:endParaRPr lang="pt-BR"/>
           </a:p>
@@ -3393,6 +3951,7 @@
     <p:sldLayoutId id="2147483657" r:id="rId9"/>
     <p:sldLayoutId id="2147483658" r:id="rId10"/>
     <p:sldLayoutId id="2147483659" r:id="rId11"/>
+    <p:sldLayoutId id="2147483660" r:id="rId12"/>
   </p:sldLayoutIdLst>
   <p:txStyles>
     <p:titleStyle>
@@ -5059,8 +5618,8 @@
           </a:prstGeom>
         </p:spPr>
       </p:pic>
-      <mc:AlternateContent xmlns:mc="http://schemas.openxmlformats.org/markup-compatibility/2006">
-        <mc:Choice xmlns:a14="http://schemas.microsoft.com/office/drawing/2010/main" Requires="a14">
+      <mc:AlternateContent xmlns:mc="http://schemas.openxmlformats.org/markup-compatibility/2006" xmlns:a14="http://schemas.microsoft.com/office/drawing/2010/main">
+        <mc:Choice Requires="a14">
           <p:sp>
             <p:nvSpPr>
               <p:cNvPr id="7" name="CaixaDeTexto 6">
@@ -5281,7 +5840,7 @@
             </p:txBody>
           </p:sp>
         </mc:Choice>
-        <mc:Fallback>
+        <mc:Fallback xmlns="">
           <p:sp>
             <p:nvSpPr>
               <p:cNvPr id="7" name="CaixaDeTexto 6">
@@ -5687,8 +6246,8 @@
           </a:p>
         </p:txBody>
       </p:sp>
-      <mc:AlternateContent xmlns:mc="http://schemas.openxmlformats.org/markup-compatibility/2006">
-        <mc:Choice xmlns:a14="http://schemas.microsoft.com/office/drawing/2010/main" Requires="a14">
+      <mc:AlternateContent xmlns:mc="http://schemas.openxmlformats.org/markup-compatibility/2006" xmlns:a14="http://schemas.microsoft.com/office/drawing/2010/main">
+        <mc:Choice Requires="a14">
           <p:sp>
             <p:nvSpPr>
               <p:cNvPr id="3" name="Espaço Reservado para Conteúdo 2">
@@ -5999,7 +6558,7 @@
             </p:txBody>
           </p:sp>
         </mc:Choice>
-        <mc:Fallback>
+        <mc:Fallback xmlns="">
           <p:sp>
             <p:nvSpPr>
               <p:cNvPr id="3" name="Espaço Reservado para Conteúdo 2">
@@ -6994,8 +7553,8 @@
           </a:p>
         </p:txBody>
       </p:sp>
-      <mc:AlternateContent xmlns:mc="http://schemas.openxmlformats.org/markup-compatibility/2006">
-        <mc:Choice xmlns:a14="http://schemas.microsoft.com/office/drawing/2010/main" Requires="a14">
+      <mc:AlternateContent xmlns:mc="http://schemas.openxmlformats.org/markup-compatibility/2006" xmlns:a14="http://schemas.microsoft.com/office/drawing/2010/main">
+        <mc:Choice Requires="a14">
           <p:sp>
             <p:nvSpPr>
               <p:cNvPr id="3" name="Espaço Reservado para Conteúdo 2">
@@ -7251,7 +7810,7 @@
             </p:txBody>
           </p:sp>
         </mc:Choice>
-        <mc:Fallback>
+        <mc:Fallback xmlns="">
           <p:sp>
             <p:nvSpPr>
               <p:cNvPr id="3" name="Espaço Reservado para Conteúdo 2">
@@ -7409,23 +7968,6 @@
                 <a:cs typeface="Arial" panose="020B0604020202020204" pitchFamily="34" charset="0"/>
               </a:rPr>
               <a:t>Sintaxe, Semântica e Simbologia</a:t>
-            </a:r>
-          </a:p>
-          <a:p>
-            <a:pPr>
-              <a:lnSpc>
-                <a:spcPct val="100000"/>
-              </a:lnSpc>
-              <a:spcAft>
-                <a:spcPts val="600"/>
-              </a:spcAft>
-            </a:pPr>
-            <a:r>
-              <a:rPr lang="pt-BR" dirty="0">
-                <a:latin typeface="Arial" panose="020B0604020202020204" pitchFamily="34" charset="0"/>
-                <a:cs typeface="Arial" panose="020B0604020202020204" pitchFamily="34" charset="0"/>
-              </a:rPr>
-              <a:t>Uso </a:t>
             </a:r>
           </a:p>
           <a:p>
@@ -7645,7 +8187,14 @@
                     <a:latin typeface="Arial" panose="020B0604020202020204" pitchFamily="34" charset="0"/>
                     <a:cs typeface="Arial" panose="020B0604020202020204" pitchFamily="34" charset="0"/>
                   </a:rPr>
-                  <a:t>x   Coroa(x) ∧ </a:t>
+                  <a:t>x   Coroa(x) </a:t>
+                </a:r>
+                <a:r>
+                  <a:rPr lang="pt-BR" sz="2400" dirty="0">
+                    <a:latin typeface="Arial" panose="020B0604020202020204" pitchFamily="34" charset="0"/>
+                    <a:cs typeface="Arial" panose="020B0604020202020204" pitchFamily="34" charset="0"/>
+                  </a:rPr>
+                  <a:t>∧ </a:t>
                 </a:r>
                 <a:r>
                   <a:rPr lang="pt-BR" sz="2400" i="1" dirty="0" err="1">
@@ -8098,13 +8647,13 @@
                 <a:latin typeface="Arial" panose="020B0604020202020204" pitchFamily="34" charset="0"/>
                 <a:cs typeface="Arial" panose="020B0604020202020204" pitchFamily="34" charset="0"/>
               </a:rPr>
-              <a:t>Simbologia da Lógica de Primeira Ordem</a:t>
+              <a:t>Semântica da Lógica de Primeira Ordem</a:t>
             </a:r>
           </a:p>
         </p:txBody>
       </p:sp>
-      <mc:AlternateContent xmlns:mc="http://schemas.openxmlformats.org/markup-compatibility/2006">
-        <mc:Choice xmlns:a14="http://schemas.microsoft.com/office/drawing/2010/main" Requires="a14">
+      <mc:AlternateContent xmlns:mc="http://schemas.openxmlformats.org/markup-compatibility/2006" xmlns:a14="http://schemas.microsoft.com/office/drawing/2010/main">
+        <mc:Choice Requires="a14">
           <p:sp>
             <p:nvSpPr>
               <p:cNvPr id="3" name="Espaço Reservado para Conteúdo 2">
@@ -8379,7 +8928,7 @@
             </p:txBody>
           </p:sp>
         </mc:Choice>
-        <mc:Fallback>
+        <mc:Fallback xmlns="">
           <p:sp>
             <p:nvSpPr>
               <p:cNvPr id="3" name="Espaço Reservado para Conteúdo 2">
@@ -8427,6 +8976,1898 @@
     <p:extLst>
       <p:ext uri="{BB962C8B-B14F-4D97-AF65-F5344CB8AC3E}">
         <p14:creationId xmlns:p14="http://schemas.microsoft.com/office/powerpoint/2010/main" val="3060086504"/>
+      </p:ext>
+    </p:extLst>
+  </p:cSld>
+  <p:clrMapOvr>
+    <a:masterClrMapping/>
+  </p:clrMapOvr>
+</p:sld>
+</file>
+
+<file path=ppt/slides/slide23.xml><?xml version="1.0" encoding="utf-8"?>
+<p:sld xmlns:a="http://schemas.openxmlformats.org/drawingml/2006/main" xmlns:r="http://schemas.openxmlformats.org/officeDocument/2006/relationships" xmlns:p="http://schemas.openxmlformats.org/presentationml/2006/main">
+  <p:cSld>
+    <p:spTree>
+      <p:nvGrpSpPr>
+        <p:cNvPr id="1" name=""/>
+        <p:cNvGrpSpPr/>
+        <p:nvPr/>
+      </p:nvGrpSpPr>
+      <p:grpSpPr>
+        <a:xfrm>
+          <a:off x="0" y="0"/>
+          <a:ext cx="0" cy="0"/>
+          <a:chOff x="0" y="0"/>
+          <a:chExt cx="0" cy="0"/>
+        </a:xfrm>
+      </p:grpSpPr>
+      <p:sp>
+        <p:nvSpPr>
+          <p:cNvPr id="2" name="Título 1">
+            <a:extLst>
+              <a:ext uri="{FF2B5EF4-FFF2-40B4-BE49-F238E27FC236}">
+                <a16:creationId xmlns:a16="http://schemas.microsoft.com/office/drawing/2014/main" id="{CE2A4DA7-6518-45B1-9ECD-6F7F91729AB1}"/>
+              </a:ext>
+            </a:extLst>
+          </p:cNvPr>
+          <p:cNvSpPr>
+            <a:spLocks noGrp="1"/>
+          </p:cNvSpPr>
+          <p:nvPr>
+            <p:ph type="title"/>
+          </p:nvPr>
+        </p:nvSpPr>
+        <p:spPr>
+          <a:xfrm>
+            <a:off x="333375" y="365125"/>
+            <a:ext cx="11677649" cy="1325563"/>
+          </a:xfrm>
+        </p:spPr>
+        <p:txBody>
+          <a:bodyPr/>
+          <a:lstStyle/>
+          <a:p>
+            <a:pPr algn="ctr"/>
+            <a:r>
+              <a:rPr lang="pt-BR" dirty="0">
+                <a:latin typeface="Arial" panose="020B0604020202020204" pitchFamily="34" charset="0"/>
+                <a:cs typeface="Arial" panose="020B0604020202020204" pitchFamily="34" charset="0"/>
+              </a:rPr>
+              <a:t>Semântica da Lógica de Primeira Ordem</a:t>
+            </a:r>
+          </a:p>
+        </p:txBody>
+      </p:sp>
+      <p:sp>
+        <p:nvSpPr>
+          <p:cNvPr id="3" name="Espaço Reservado para Conteúdo 2">
+            <a:extLst>
+              <a:ext uri="{FF2B5EF4-FFF2-40B4-BE49-F238E27FC236}">
+                <a16:creationId xmlns:a16="http://schemas.microsoft.com/office/drawing/2014/main" id="{C6130D9F-B7B8-4641-AD48-2C4E7990BB71}"/>
+              </a:ext>
+            </a:extLst>
+          </p:cNvPr>
+          <p:cNvSpPr>
+            <a:spLocks noGrp="1"/>
+          </p:cNvSpPr>
+          <p:nvPr>
+            <p:ph idx="1"/>
+          </p:nvPr>
+        </p:nvSpPr>
+        <p:spPr>
+          <a:xfrm>
+            <a:off x="715347" y="1838065"/>
+            <a:ext cx="10885714" cy="4351338"/>
+          </a:xfrm>
+        </p:spPr>
+        <p:txBody>
+          <a:bodyPr>
+            <a:normAutofit/>
+          </a:bodyPr>
+          <a:lstStyle/>
+          <a:p>
+            <a:pPr marL="0" indent="0">
+              <a:lnSpc>
+                <a:spcPct val="100000"/>
+              </a:lnSpc>
+              <a:buNone/>
+            </a:pPr>
+            <a:r>
+              <a:rPr lang="pt-BR" b="1" dirty="0">
+                <a:latin typeface="Arial" panose="020B0604020202020204" pitchFamily="34" charset="0"/>
+                <a:cs typeface="Arial" panose="020B0604020202020204" pitchFamily="34" charset="0"/>
+              </a:rPr>
+              <a:t>Semântica de Banco de Dados</a:t>
+            </a:r>
+          </a:p>
+          <a:p>
+            <a:pPr marL="0" indent="0">
+              <a:lnSpc>
+                <a:spcPct val="100000"/>
+              </a:lnSpc>
+              <a:buNone/>
+            </a:pPr>
+            <a:r>
+              <a:rPr lang="pt-BR" sz="2000" b="1" dirty="0">
+                <a:latin typeface="Arial" panose="020B0604020202020204" pitchFamily="34" charset="0"/>
+                <a:cs typeface="Arial" panose="020B0604020202020204" pitchFamily="34" charset="0"/>
+              </a:rPr>
+              <a:t>	</a:t>
+            </a:r>
+            <a:r>
+              <a:rPr lang="pt-BR" sz="2000" dirty="0">
+                <a:latin typeface="Arial" panose="020B0604020202020204" pitchFamily="34" charset="0"/>
+                <a:cs typeface="Arial" panose="020B0604020202020204" pitchFamily="34" charset="0"/>
+              </a:rPr>
+              <a:t>Para evitar problemas, são feitas algumas considerações:</a:t>
+            </a:r>
+          </a:p>
+          <a:p>
+            <a:pPr marL="0" indent="0">
+              <a:lnSpc>
+                <a:spcPct val="100000"/>
+              </a:lnSpc>
+              <a:buNone/>
+            </a:pPr>
+            <a:r>
+              <a:rPr lang="pt-BR" sz="2000" i="1" dirty="0">
+                <a:latin typeface="Arial" panose="020B0604020202020204" pitchFamily="34" charset="0"/>
+                <a:cs typeface="Arial" panose="020B0604020202020204" pitchFamily="34" charset="0"/>
+              </a:rPr>
+              <a:t>	</a:t>
+            </a:r>
+            <a:r>
+              <a:rPr lang="pt-BR" sz="2000" b="1" i="1" dirty="0">
+                <a:latin typeface="Arial" panose="020B0604020202020204" pitchFamily="34" charset="0"/>
+                <a:cs typeface="Arial" panose="020B0604020202020204" pitchFamily="34" charset="0"/>
+              </a:rPr>
+              <a:t>a) Unicidade de Nomes</a:t>
+            </a:r>
+            <a:r>
+              <a:rPr lang="pt-BR" sz="2000" i="1" dirty="0">
+                <a:latin typeface="Arial" panose="020B0604020202020204" pitchFamily="34" charset="0"/>
+                <a:cs typeface="Arial" panose="020B0604020202020204" pitchFamily="34" charset="0"/>
+              </a:rPr>
+              <a:t>: </a:t>
+            </a:r>
+            <a:r>
+              <a:rPr lang="pt-BR" sz="2000" dirty="0">
+                <a:latin typeface="Arial" panose="020B0604020202020204" pitchFamily="34" charset="0"/>
+                <a:cs typeface="Arial" panose="020B0604020202020204" pitchFamily="34" charset="0"/>
+              </a:rPr>
+              <a:t>cada símbolo constante se refere à um objeto diferente.</a:t>
+            </a:r>
+          </a:p>
+          <a:p>
+            <a:pPr marL="0" indent="0">
+              <a:lnSpc>
+                <a:spcPct val="100000"/>
+              </a:lnSpc>
+              <a:buNone/>
+            </a:pPr>
+            <a:r>
+              <a:rPr lang="pt-BR" sz="2000" i="1" dirty="0">
+                <a:latin typeface="Arial" panose="020B0604020202020204" pitchFamily="34" charset="0"/>
+                <a:cs typeface="Arial" panose="020B0604020202020204" pitchFamily="34" charset="0"/>
+              </a:rPr>
+              <a:t>	</a:t>
+            </a:r>
+            <a:r>
+              <a:rPr lang="pt-BR" sz="2000" b="1" i="1" dirty="0">
+                <a:latin typeface="Arial" panose="020B0604020202020204" pitchFamily="34" charset="0"/>
+                <a:cs typeface="Arial" panose="020B0604020202020204" pitchFamily="34" charset="0"/>
+              </a:rPr>
+              <a:t>b) Ambiente Fechado</a:t>
+            </a:r>
+            <a:r>
+              <a:rPr lang="pt-BR" sz="2000" i="1" dirty="0">
+                <a:latin typeface="Arial" panose="020B0604020202020204" pitchFamily="34" charset="0"/>
+                <a:cs typeface="Arial" panose="020B0604020202020204" pitchFamily="34" charset="0"/>
+              </a:rPr>
+              <a:t>: </a:t>
+            </a:r>
+            <a:r>
+              <a:rPr lang="pt-BR" sz="2000" dirty="0">
+                <a:latin typeface="Arial" panose="020B0604020202020204" pitchFamily="34" charset="0"/>
+                <a:cs typeface="Arial" panose="020B0604020202020204" pitchFamily="34" charset="0"/>
+              </a:rPr>
+              <a:t>toda sentença não VERDADEIRA é tida como FALSA.</a:t>
+            </a:r>
+          </a:p>
+          <a:p>
+            <a:pPr marL="0" indent="0">
+              <a:lnSpc>
+                <a:spcPct val="100000"/>
+              </a:lnSpc>
+              <a:buNone/>
+            </a:pPr>
+            <a:r>
+              <a:rPr lang="pt-BR" sz="2000" i="1" dirty="0">
+                <a:latin typeface="Arial" panose="020B0604020202020204" pitchFamily="34" charset="0"/>
+                <a:cs typeface="Arial" panose="020B0604020202020204" pitchFamily="34" charset="0"/>
+              </a:rPr>
+              <a:t>	</a:t>
+            </a:r>
+            <a:r>
+              <a:rPr lang="pt-BR" sz="2000" b="1" i="1" dirty="0">
+                <a:latin typeface="Arial" panose="020B0604020202020204" pitchFamily="34" charset="0"/>
+                <a:cs typeface="Arial" panose="020B0604020202020204" pitchFamily="34" charset="0"/>
+              </a:rPr>
+              <a:t>c) Completude de Domínio</a:t>
+            </a:r>
+            <a:r>
+              <a:rPr lang="pt-BR" sz="2000" i="1" dirty="0">
+                <a:latin typeface="Arial" panose="020B0604020202020204" pitchFamily="34" charset="0"/>
+                <a:cs typeface="Arial" panose="020B0604020202020204" pitchFamily="34" charset="0"/>
+              </a:rPr>
+              <a:t>: </a:t>
+            </a:r>
+            <a:r>
+              <a:rPr lang="pt-BR" sz="2000" dirty="0">
+                <a:latin typeface="Arial" panose="020B0604020202020204" pitchFamily="34" charset="0"/>
+                <a:cs typeface="Arial" panose="020B0604020202020204" pitchFamily="34" charset="0"/>
+              </a:rPr>
+              <a:t>cada modelo não possui elementos além dos nomeados por símbolos constantes.</a:t>
+            </a:r>
+            <a:endParaRPr lang="pt-BR" sz="2000" i="1" dirty="0">
+              <a:latin typeface="Arial" panose="020B0604020202020204" pitchFamily="34" charset="0"/>
+              <a:cs typeface="Arial" panose="020B0604020202020204" pitchFamily="34" charset="0"/>
+            </a:endParaRPr>
+          </a:p>
+          <a:p>
+            <a:pPr marL="0" indent="0">
+              <a:lnSpc>
+                <a:spcPct val="100000"/>
+              </a:lnSpc>
+              <a:buNone/>
+            </a:pPr>
+            <a:endParaRPr lang="pt-BR" sz="2400" dirty="0">
+              <a:latin typeface="Arial" panose="020B0604020202020204" pitchFamily="34" charset="0"/>
+              <a:cs typeface="Arial" panose="020B0604020202020204" pitchFamily="34" charset="0"/>
+            </a:endParaRPr>
+          </a:p>
+          <a:p>
+            <a:pPr marL="0" indent="0">
+              <a:lnSpc>
+                <a:spcPct val="100000"/>
+              </a:lnSpc>
+              <a:buNone/>
+            </a:pPr>
+            <a:endParaRPr lang="pt-BR" sz="2400" dirty="0">
+              <a:latin typeface="Arial" panose="020B0604020202020204" pitchFamily="34" charset="0"/>
+              <a:cs typeface="Arial" panose="020B0604020202020204" pitchFamily="34" charset="0"/>
+            </a:endParaRPr>
+          </a:p>
+        </p:txBody>
+      </p:sp>
+    </p:spTree>
+    <p:extLst>
+      <p:ext uri="{BB962C8B-B14F-4D97-AF65-F5344CB8AC3E}">
+        <p14:creationId xmlns:p14="http://schemas.microsoft.com/office/powerpoint/2010/main" val="1208342009"/>
+      </p:ext>
+    </p:extLst>
+  </p:cSld>
+  <p:clrMapOvr>
+    <a:masterClrMapping/>
+  </p:clrMapOvr>
+</p:sld>
+</file>
+
+<file path=ppt/slides/slide24.xml><?xml version="1.0" encoding="utf-8"?>
+<p:sld xmlns:a="http://schemas.openxmlformats.org/drawingml/2006/main" xmlns:r="http://schemas.openxmlformats.org/officeDocument/2006/relationships" xmlns:p="http://schemas.openxmlformats.org/presentationml/2006/main">
+  <p:cSld>
+    <p:spTree>
+      <p:nvGrpSpPr>
+        <p:cNvPr id="1" name=""/>
+        <p:cNvGrpSpPr/>
+        <p:nvPr/>
+      </p:nvGrpSpPr>
+      <p:grpSpPr>
+        <a:xfrm>
+          <a:off x="0" y="0"/>
+          <a:ext cx="0" cy="0"/>
+          <a:chOff x="0" y="0"/>
+          <a:chExt cx="0" cy="0"/>
+        </a:xfrm>
+      </p:grpSpPr>
+      <p:sp>
+        <p:nvSpPr>
+          <p:cNvPr id="2" name="Título 1">
+            <a:extLst>
+              <a:ext uri="{FF2B5EF4-FFF2-40B4-BE49-F238E27FC236}">
+                <a16:creationId xmlns:a16="http://schemas.microsoft.com/office/drawing/2014/main" id="{CE2A4DA7-6518-45B1-9ECD-6F7F91729AB1}"/>
+              </a:ext>
+            </a:extLst>
+          </p:cNvPr>
+          <p:cNvSpPr>
+            <a:spLocks noGrp="1"/>
+          </p:cNvSpPr>
+          <p:nvPr>
+            <p:ph type="title"/>
+          </p:nvPr>
+        </p:nvSpPr>
+        <p:spPr>
+          <a:xfrm>
+            <a:off x="333375" y="365125"/>
+            <a:ext cx="11677649" cy="1325563"/>
+          </a:xfrm>
+        </p:spPr>
+        <p:txBody>
+          <a:bodyPr/>
+          <a:lstStyle/>
+          <a:p>
+            <a:pPr algn="ctr"/>
+            <a:r>
+              <a:rPr lang="pt-BR" dirty="0">
+                <a:latin typeface="Arial" panose="020B0604020202020204" pitchFamily="34" charset="0"/>
+                <a:cs typeface="Arial" panose="020B0604020202020204" pitchFamily="34" charset="0"/>
+              </a:rPr>
+              <a:t>Uso da Lógica de Primeira Ordem</a:t>
+            </a:r>
+          </a:p>
+        </p:txBody>
+      </p:sp>
+      <p:sp>
+        <p:nvSpPr>
+          <p:cNvPr id="3" name="Espaço Reservado para Conteúdo 2">
+            <a:extLst>
+              <a:ext uri="{FF2B5EF4-FFF2-40B4-BE49-F238E27FC236}">
+                <a16:creationId xmlns:a16="http://schemas.microsoft.com/office/drawing/2014/main" id="{C6130D9F-B7B8-4641-AD48-2C4E7990BB71}"/>
+              </a:ext>
+            </a:extLst>
+          </p:cNvPr>
+          <p:cNvSpPr>
+            <a:spLocks noGrp="1"/>
+          </p:cNvSpPr>
+          <p:nvPr>
+            <p:ph idx="1"/>
+          </p:nvPr>
+        </p:nvSpPr>
+        <p:spPr>
+          <a:xfrm>
+            <a:off x="715347" y="1838065"/>
+            <a:ext cx="10885714" cy="4351338"/>
+          </a:xfrm>
+        </p:spPr>
+        <p:txBody>
+          <a:bodyPr>
+            <a:normAutofit/>
+          </a:bodyPr>
+          <a:lstStyle/>
+          <a:p>
+            <a:pPr marL="0" indent="0">
+              <a:lnSpc>
+                <a:spcPct val="100000"/>
+              </a:lnSpc>
+              <a:buNone/>
+            </a:pPr>
+            <a:r>
+              <a:rPr lang="pt-BR" b="1" dirty="0">
+                <a:latin typeface="Arial" panose="020B0604020202020204" pitchFamily="34" charset="0"/>
+                <a:cs typeface="Arial" panose="020B0604020202020204" pitchFamily="34" charset="0"/>
+              </a:rPr>
+              <a:t>TELL e ASK</a:t>
+            </a:r>
+          </a:p>
+          <a:p>
+            <a:pPr marL="0" indent="0">
+              <a:lnSpc>
+                <a:spcPct val="100000"/>
+              </a:lnSpc>
+              <a:buNone/>
+            </a:pPr>
+            <a:r>
+              <a:rPr lang="pt-BR" sz="2000" b="1" dirty="0">
+                <a:latin typeface="Arial" panose="020B0604020202020204" pitchFamily="34" charset="0"/>
+                <a:cs typeface="Arial" panose="020B0604020202020204" pitchFamily="34" charset="0"/>
+              </a:rPr>
+              <a:t>	</a:t>
+            </a:r>
+            <a:r>
+              <a:rPr lang="pt-BR" sz="2000" dirty="0">
+                <a:latin typeface="Arial" panose="020B0604020202020204" pitchFamily="34" charset="0"/>
+                <a:cs typeface="Arial" panose="020B0604020202020204" pitchFamily="34" charset="0"/>
+              </a:rPr>
+              <a:t>Assim como na Lógica de Primeira Ordem, podemos criar uma Base de Conhecimento KB usando as funções TELL e ASK. </a:t>
+            </a:r>
+          </a:p>
+          <a:p>
+            <a:pPr marL="0" indent="0">
+              <a:lnSpc>
+                <a:spcPct val="100000"/>
+              </a:lnSpc>
+              <a:buNone/>
+            </a:pPr>
+            <a:endParaRPr lang="pt-BR" sz="2000" i="1" dirty="0">
+              <a:latin typeface="Arial" panose="020B0604020202020204" pitchFamily="34" charset="0"/>
+              <a:cs typeface="Arial" panose="020B0604020202020204" pitchFamily="34" charset="0"/>
+            </a:endParaRPr>
+          </a:p>
+          <a:p>
+            <a:pPr marL="0" indent="0">
+              <a:lnSpc>
+                <a:spcPct val="100000"/>
+              </a:lnSpc>
+              <a:buNone/>
+            </a:pPr>
+            <a:r>
+              <a:rPr lang="pt-BR" sz="2000" i="1" dirty="0">
+                <a:latin typeface="Arial" panose="020B0604020202020204" pitchFamily="34" charset="0"/>
+                <a:cs typeface="Arial" panose="020B0604020202020204" pitchFamily="34" charset="0"/>
+              </a:rPr>
+              <a:t>	Exemplo: </a:t>
+            </a:r>
+            <a:r>
+              <a:rPr lang="pt-BR" sz="2000" dirty="0">
+                <a:latin typeface="Arial" panose="020B0604020202020204" pitchFamily="34" charset="0"/>
+                <a:cs typeface="Arial" panose="020B0604020202020204" pitchFamily="34" charset="0"/>
+              </a:rPr>
+              <a:t>TELL(KB, Rei(João))</a:t>
+            </a:r>
+          </a:p>
+          <a:p>
+            <a:pPr marL="0" indent="0">
+              <a:lnSpc>
+                <a:spcPct val="100000"/>
+              </a:lnSpc>
+              <a:buNone/>
+            </a:pPr>
+            <a:r>
+              <a:rPr lang="pt-BR" sz="2000" i="1" dirty="0">
+                <a:latin typeface="Arial" panose="020B0604020202020204" pitchFamily="34" charset="0"/>
+                <a:cs typeface="Arial" panose="020B0604020202020204" pitchFamily="34" charset="0"/>
+              </a:rPr>
+              <a:t>		   </a:t>
+            </a:r>
+            <a:r>
+              <a:rPr lang="pt-BR" sz="2000" dirty="0">
+                <a:latin typeface="Arial" panose="020B0604020202020204" pitchFamily="34" charset="0"/>
+                <a:cs typeface="Arial" panose="020B0604020202020204" pitchFamily="34" charset="0"/>
+              </a:rPr>
+              <a:t>TELL(KB, Pessoa(Ricardo))</a:t>
+            </a:r>
+          </a:p>
+          <a:p>
+            <a:pPr marL="0" indent="0">
+              <a:lnSpc>
+                <a:spcPct val="100000"/>
+              </a:lnSpc>
+              <a:buNone/>
+            </a:pPr>
+            <a:endParaRPr lang="pt-BR" sz="2000" i="1" dirty="0">
+              <a:latin typeface="Arial" panose="020B0604020202020204" pitchFamily="34" charset="0"/>
+              <a:cs typeface="Arial" panose="020B0604020202020204" pitchFamily="34" charset="0"/>
+            </a:endParaRPr>
+          </a:p>
+          <a:p>
+            <a:pPr marL="0" indent="0">
+              <a:lnSpc>
+                <a:spcPct val="100000"/>
+              </a:lnSpc>
+              <a:buNone/>
+            </a:pPr>
+            <a:r>
+              <a:rPr lang="pt-BR" sz="2000" i="1" dirty="0">
+                <a:latin typeface="Arial" panose="020B0604020202020204" pitchFamily="34" charset="0"/>
+                <a:cs typeface="Arial" panose="020B0604020202020204" pitchFamily="34" charset="0"/>
+              </a:rPr>
+              <a:t>	</a:t>
+            </a:r>
+            <a:r>
+              <a:rPr lang="pt-BR" sz="2000" dirty="0">
+                <a:latin typeface="Arial" panose="020B0604020202020204" pitchFamily="34" charset="0"/>
+                <a:cs typeface="Arial" panose="020B0604020202020204" pitchFamily="34" charset="0"/>
+              </a:rPr>
+              <a:t>E para verificar se uma sentença é verdadeira, usamos ASK:</a:t>
+            </a:r>
+          </a:p>
+          <a:p>
+            <a:pPr marL="0" indent="0">
+              <a:lnSpc>
+                <a:spcPct val="100000"/>
+              </a:lnSpc>
+              <a:buNone/>
+            </a:pPr>
+            <a:r>
+              <a:rPr lang="pt-BR" sz="2000" i="1" dirty="0">
+                <a:latin typeface="Arial" panose="020B0604020202020204" pitchFamily="34" charset="0"/>
+                <a:cs typeface="Arial" panose="020B0604020202020204" pitchFamily="34" charset="0"/>
+              </a:rPr>
+              <a:t>		   </a:t>
+            </a:r>
+            <a:r>
+              <a:rPr lang="pt-BR" sz="2000" dirty="0">
+                <a:latin typeface="Arial" panose="020B0604020202020204" pitchFamily="34" charset="0"/>
+                <a:cs typeface="Arial" panose="020B0604020202020204" pitchFamily="34" charset="0"/>
+              </a:rPr>
+              <a:t>ASK(KB, Rei(João))</a:t>
+            </a:r>
+            <a:endParaRPr lang="pt-BR" sz="2000" i="1" dirty="0">
+              <a:latin typeface="Arial" panose="020B0604020202020204" pitchFamily="34" charset="0"/>
+              <a:cs typeface="Arial" panose="020B0604020202020204" pitchFamily="34" charset="0"/>
+            </a:endParaRPr>
+          </a:p>
+          <a:p>
+            <a:pPr marL="0" indent="0">
+              <a:lnSpc>
+                <a:spcPct val="100000"/>
+              </a:lnSpc>
+              <a:buNone/>
+            </a:pPr>
+            <a:endParaRPr lang="pt-BR" sz="2400" dirty="0">
+              <a:latin typeface="Arial" panose="020B0604020202020204" pitchFamily="34" charset="0"/>
+              <a:cs typeface="Arial" panose="020B0604020202020204" pitchFamily="34" charset="0"/>
+            </a:endParaRPr>
+          </a:p>
+          <a:p>
+            <a:pPr marL="0" indent="0">
+              <a:lnSpc>
+                <a:spcPct val="100000"/>
+              </a:lnSpc>
+              <a:buNone/>
+            </a:pPr>
+            <a:endParaRPr lang="pt-BR" sz="2400" dirty="0">
+              <a:latin typeface="Arial" panose="020B0604020202020204" pitchFamily="34" charset="0"/>
+              <a:cs typeface="Arial" panose="020B0604020202020204" pitchFamily="34" charset="0"/>
+            </a:endParaRPr>
+          </a:p>
+        </p:txBody>
+      </p:sp>
+    </p:spTree>
+    <p:extLst>
+      <p:ext uri="{BB962C8B-B14F-4D97-AF65-F5344CB8AC3E}">
+        <p14:creationId xmlns:p14="http://schemas.microsoft.com/office/powerpoint/2010/main" val="1866078762"/>
+      </p:ext>
+    </p:extLst>
+  </p:cSld>
+  <p:clrMapOvr>
+    <a:masterClrMapping/>
+  </p:clrMapOvr>
+</p:sld>
+</file>
+
+<file path=ppt/slides/slide25.xml><?xml version="1.0" encoding="utf-8"?>
+<p:sld xmlns:a="http://schemas.openxmlformats.org/drawingml/2006/main" xmlns:r="http://schemas.openxmlformats.org/officeDocument/2006/relationships" xmlns:p="http://schemas.openxmlformats.org/presentationml/2006/main">
+  <p:cSld>
+    <p:spTree>
+      <p:nvGrpSpPr>
+        <p:cNvPr id="1" name=""/>
+        <p:cNvGrpSpPr/>
+        <p:nvPr/>
+      </p:nvGrpSpPr>
+      <p:grpSpPr>
+        <a:xfrm>
+          <a:off x="0" y="0"/>
+          <a:ext cx="0" cy="0"/>
+          <a:chOff x="0" y="0"/>
+          <a:chExt cx="0" cy="0"/>
+        </a:xfrm>
+      </p:grpSpPr>
+      <p:sp>
+        <p:nvSpPr>
+          <p:cNvPr id="2" name="Título 1">
+            <a:extLst>
+              <a:ext uri="{FF2B5EF4-FFF2-40B4-BE49-F238E27FC236}">
+                <a16:creationId xmlns:a16="http://schemas.microsoft.com/office/drawing/2014/main" id="{CE2A4DA7-6518-45B1-9ECD-6F7F91729AB1}"/>
+              </a:ext>
+            </a:extLst>
+          </p:cNvPr>
+          <p:cNvSpPr>
+            <a:spLocks noGrp="1"/>
+          </p:cNvSpPr>
+          <p:nvPr>
+            <p:ph type="title"/>
+          </p:nvPr>
+        </p:nvSpPr>
+        <p:spPr>
+          <a:xfrm>
+            <a:off x="333375" y="365125"/>
+            <a:ext cx="11677649" cy="1325563"/>
+          </a:xfrm>
+        </p:spPr>
+        <p:txBody>
+          <a:bodyPr/>
+          <a:lstStyle/>
+          <a:p>
+            <a:pPr algn="ctr"/>
+            <a:r>
+              <a:rPr lang="pt-BR" dirty="0">
+                <a:latin typeface="Arial" panose="020B0604020202020204" pitchFamily="34" charset="0"/>
+                <a:cs typeface="Arial" panose="020B0604020202020204" pitchFamily="34" charset="0"/>
+              </a:rPr>
+              <a:t>Uso da Lógica de Primeira Ordem</a:t>
+            </a:r>
+          </a:p>
+        </p:txBody>
+      </p:sp>
+      <p:sp>
+        <p:nvSpPr>
+          <p:cNvPr id="3" name="Espaço Reservado para Conteúdo 2">
+            <a:extLst>
+              <a:ext uri="{FF2B5EF4-FFF2-40B4-BE49-F238E27FC236}">
+                <a16:creationId xmlns:a16="http://schemas.microsoft.com/office/drawing/2014/main" id="{C6130D9F-B7B8-4641-AD48-2C4E7990BB71}"/>
+              </a:ext>
+            </a:extLst>
+          </p:cNvPr>
+          <p:cNvSpPr>
+            <a:spLocks noGrp="1"/>
+          </p:cNvSpPr>
+          <p:nvPr>
+            <p:ph idx="1"/>
+          </p:nvPr>
+        </p:nvSpPr>
+        <p:spPr>
+          <a:xfrm>
+            <a:off x="715347" y="1838065"/>
+            <a:ext cx="10885714" cy="4351338"/>
+          </a:xfrm>
+        </p:spPr>
+        <p:txBody>
+          <a:bodyPr>
+            <a:normAutofit fontScale="92500" lnSpcReduction="20000"/>
+          </a:bodyPr>
+          <a:lstStyle/>
+          <a:p>
+            <a:pPr marL="0" indent="0">
+              <a:lnSpc>
+                <a:spcPct val="100000"/>
+              </a:lnSpc>
+              <a:buNone/>
+            </a:pPr>
+            <a:r>
+              <a:rPr lang="pt-BR" b="1" dirty="0">
+                <a:latin typeface="Arial" panose="020B0604020202020204" pitchFamily="34" charset="0"/>
+                <a:cs typeface="Arial" panose="020B0604020202020204" pitchFamily="34" charset="0"/>
+              </a:rPr>
+              <a:t>TELL e ASK</a:t>
+            </a:r>
+          </a:p>
+          <a:p>
+            <a:pPr marL="0" indent="0">
+              <a:lnSpc>
+                <a:spcPct val="100000"/>
+              </a:lnSpc>
+              <a:buNone/>
+            </a:pPr>
+            <a:r>
+              <a:rPr lang="pt-BR" sz="2000" b="1" dirty="0">
+                <a:latin typeface="Arial" panose="020B0604020202020204" pitchFamily="34" charset="0"/>
+                <a:cs typeface="Arial" panose="020B0604020202020204" pitchFamily="34" charset="0"/>
+              </a:rPr>
+              <a:t>	</a:t>
+            </a:r>
+            <a:r>
+              <a:rPr lang="pt-BR" sz="2000" dirty="0">
+                <a:latin typeface="Arial" panose="020B0604020202020204" pitchFamily="34" charset="0"/>
+                <a:cs typeface="Arial" panose="020B0604020202020204" pitchFamily="34" charset="0"/>
+              </a:rPr>
+              <a:t>Sentenças usando Quantificadores também são reconhecidas</a:t>
+            </a:r>
+          </a:p>
+          <a:p>
+            <a:pPr marL="0" indent="0">
+              <a:lnSpc>
+                <a:spcPct val="100000"/>
+              </a:lnSpc>
+              <a:buNone/>
+            </a:pPr>
+            <a:endParaRPr lang="pt-BR" sz="2000" i="1" dirty="0">
+              <a:latin typeface="Arial" panose="020B0604020202020204" pitchFamily="34" charset="0"/>
+              <a:cs typeface="Arial" panose="020B0604020202020204" pitchFamily="34" charset="0"/>
+            </a:endParaRPr>
+          </a:p>
+          <a:p>
+            <a:pPr marL="0" indent="0">
+              <a:lnSpc>
+                <a:spcPct val="100000"/>
+              </a:lnSpc>
+              <a:buNone/>
+            </a:pPr>
+            <a:r>
+              <a:rPr lang="pt-BR" sz="2000" i="1" dirty="0">
+                <a:latin typeface="Arial" panose="020B0604020202020204" pitchFamily="34" charset="0"/>
+                <a:cs typeface="Arial" panose="020B0604020202020204" pitchFamily="34" charset="0"/>
+              </a:rPr>
+              <a:t>	Exemplo: </a:t>
+            </a:r>
+            <a:r>
+              <a:rPr lang="pt-BR" sz="2000" dirty="0">
+                <a:latin typeface="Arial" panose="020B0604020202020204" pitchFamily="34" charset="0"/>
+                <a:cs typeface="Arial" panose="020B0604020202020204" pitchFamily="34" charset="0"/>
+              </a:rPr>
+              <a:t>ASK(KB,</a:t>
+            </a:r>
+            <a:r>
+              <a:rPr lang="pt-BR" sz="2000" i="1" dirty="0">
+                <a:latin typeface="Arial" panose="020B0604020202020204" pitchFamily="34" charset="0"/>
+                <a:cs typeface="Arial" panose="020B0604020202020204" pitchFamily="34" charset="0"/>
+              </a:rPr>
+              <a:t> </a:t>
+            </a:r>
+            <a:r>
+              <a:rPr lang="pt-BR" sz="2400" dirty="0">
+                <a:latin typeface="Arial" panose="020B0604020202020204" pitchFamily="34" charset="0"/>
+                <a:cs typeface="Arial" panose="020B0604020202020204" pitchFamily="34" charset="0"/>
+              </a:rPr>
+              <a:t>∃</a:t>
+            </a:r>
+            <a:r>
+              <a:rPr lang="pt-BR" sz="1600" i="1" dirty="0">
+                <a:latin typeface="Arial" panose="020B0604020202020204" pitchFamily="34" charset="0"/>
+                <a:cs typeface="Arial" panose="020B0604020202020204" pitchFamily="34" charset="0"/>
+              </a:rPr>
+              <a:t>x</a:t>
+            </a:r>
+            <a:r>
+              <a:rPr lang="pt-BR" sz="2000" dirty="0">
+                <a:latin typeface="Arial" panose="020B0604020202020204" pitchFamily="34" charset="0"/>
+                <a:cs typeface="Arial" panose="020B0604020202020204" pitchFamily="34" charset="0"/>
+              </a:rPr>
+              <a:t> Pessoa(x)).</a:t>
+            </a:r>
+          </a:p>
+          <a:p>
+            <a:pPr marL="0" indent="0">
+              <a:lnSpc>
+                <a:spcPct val="100000"/>
+              </a:lnSpc>
+              <a:buNone/>
+            </a:pPr>
+            <a:endParaRPr lang="pt-BR" sz="2000" dirty="0">
+              <a:latin typeface="Arial" panose="020B0604020202020204" pitchFamily="34" charset="0"/>
+              <a:cs typeface="Arial" panose="020B0604020202020204" pitchFamily="34" charset="0"/>
+            </a:endParaRPr>
+          </a:p>
+          <a:p>
+            <a:pPr marL="0" indent="0">
+              <a:lnSpc>
+                <a:spcPct val="100000"/>
+              </a:lnSpc>
+              <a:buNone/>
+            </a:pPr>
+            <a:r>
+              <a:rPr lang="pt-BR" sz="2000" dirty="0">
+                <a:latin typeface="Arial" panose="020B0604020202020204" pitchFamily="34" charset="0"/>
+                <a:cs typeface="Arial" panose="020B0604020202020204" pitchFamily="34" charset="0"/>
+              </a:rPr>
+              <a:t>	Neste caso, a resposta é simplesmente VERDADEIRO, o que não é muito útil. Para obter todos objetos que atendem algum requisito, podemos usar ASKVARS</a:t>
+            </a:r>
+          </a:p>
+          <a:p>
+            <a:pPr marL="0" indent="0">
+              <a:lnSpc>
+                <a:spcPct val="100000"/>
+              </a:lnSpc>
+              <a:buNone/>
+            </a:pPr>
+            <a:endParaRPr lang="pt-BR" sz="2000" dirty="0">
+              <a:latin typeface="Arial" panose="020B0604020202020204" pitchFamily="34" charset="0"/>
+              <a:cs typeface="Arial" panose="020B0604020202020204" pitchFamily="34" charset="0"/>
+            </a:endParaRPr>
+          </a:p>
+          <a:p>
+            <a:pPr marL="0" indent="0">
+              <a:lnSpc>
+                <a:spcPct val="100000"/>
+              </a:lnSpc>
+              <a:buNone/>
+            </a:pPr>
+            <a:r>
+              <a:rPr lang="pt-BR" sz="2000" dirty="0">
+                <a:latin typeface="Arial" panose="020B0604020202020204" pitchFamily="34" charset="0"/>
+                <a:cs typeface="Arial" panose="020B0604020202020204" pitchFamily="34" charset="0"/>
+              </a:rPr>
+              <a:t>	</a:t>
+            </a:r>
+            <a:r>
+              <a:rPr lang="pt-BR" sz="2000" i="1" dirty="0">
+                <a:latin typeface="Arial" panose="020B0604020202020204" pitchFamily="34" charset="0"/>
+                <a:cs typeface="Arial" panose="020B0604020202020204" pitchFamily="34" charset="0"/>
+              </a:rPr>
+              <a:t>Exemplo: </a:t>
+            </a:r>
+            <a:r>
+              <a:rPr lang="pt-BR" sz="2000" dirty="0">
+                <a:latin typeface="Arial" panose="020B0604020202020204" pitchFamily="34" charset="0"/>
+                <a:cs typeface="Arial" panose="020B0604020202020204" pitchFamily="34" charset="0"/>
+              </a:rPr>
+              <a:t>ASKVARS(KB, Pessoa(x)) </a:t>
+            </a:r>
+          </a:p>
+          <a:p>
+            <a:pPr marL="0" indent="0">
+              <a:lnSpc>
+                <a:spcPct val="100000"/>
+              </a:lnSpc>
+              <a:buNone/>
+            </a:pPr>
+            <a:endParaRPr lang="pt-BR" sz="2000" dirty="0">
+              <a:latin typeface="Arial" panose="020B0604020202020204" pitchFamily="34" charset="0"/>
+              <a:cs typeface="Arial" panose="020B0604020202020204" pitchFamily="34" charset="0"/>
+            </a:endParaRPr>
+          </a:p>
+          <a:p>
+            <a:pPr marL="0" indent="0">
+              <a:lnSpc>
+                <a:spcPct val="100000"/>
+              </a:lnSpc>
+              <a:buNone/>
+            </a:pPr>
+            <a:r>
+              <a:rPr lang="pt-BR" sz="2400" dirty="0">
+                <a:latin typeface="Arial" panose="020B0604020202020204" pitchFamily="34" charset="0"/>
+                <a:cs typeface="Arial" panose="020B0604020202020204" pitchFamily="34" charset="0"/>
+              </a:rPr>
+              <a:t>	</a:t>
+            </a:r>
+            <a:r>
+              <a:rPr lang="pt-BR" sz="2200" dirty="0">
+                <a:latin typeface="Arial" panose="020B0604020202020204" pitchFamily="34" charset="0"/>
+                <a:cs typeface="Arial" panose="020B0604020202020204" pitchFamily="34" charset="0"/>
+              </a:rPr>
+              <a:t>Então, serão retornados dois objetos: {x | João} e {x | Ricardo}. Esse tipo de resposta chama-se </a:t>
+            </a:r>
+            <a:r>
+              <a:rPr lang="pt-BR" sz="2200" b="1" dirty="0">
+                <a:latin typeface="Arial" panose="020B0604020202020204" pitchFamily="34" charset="0"/>
+                <a:cs typeface="Arial" panose="020B0604020202020204" pitchFamily="34" charset="0"/>
+              </a:rPr>
+              <a:t>substituição</a:t>
+            </a:r>
+            <a:r>
+              <a:rPr lang="pt-BR" sz="2200" dirty="0">
+                <a:latin typeface="Arial" panose="020B0604020202020204" pitchFamily="34" charset="0"/>
+                <a:cs typeface="Arial" panose="020B0604020202020204" pitchFamily="34" charset="0"/>
+              </a:rPr>
+              <a:t> ou </a:t>
+            </a:r>
+            <a:r>
+              <a:rPr lang="pt-BR" sz="2200" b="1" dirty="0">
+                <a:latin typeface="Arial" panose="020B0604020202020204" pitchFamily="34" charset="0"/>
+                <a:cs typeface="Arial" panose="020B0604020202020204" pitchFamily="34" charset="0"/>
+              </a:rPr>
+              <a:t>lista de ligação</a:t>
+            </a:r>
+            <a:r>
+              <a:rPr lang="pt-BR" sz="2200" dirty="0">
+                <a:latin typeface="Arial" panose="020B0604020202020204" pitchFamily="34" charset="0"/>
+                <a:cs typeface="Arial" panose="020B0604020202020204" pitchFamily="34" charset="0"/>
+              </a:rPr>
+              <a:t>.</a:t>
+            </a:r>
+            <a:endParaRPr lang="pt-BR" sz="2400" dirty="0">
+              <a:latin typeface="Arial" panose="020B0604020202020204" pitchFamily="34" charset="0"/>
+              <a:cs typeface="Arial" panose="020B0604020202020204" pitchFamily="34" charset="0"/>
+            </a:endParaRPr>
+          </a:p>
+          <a:p>
+            <a:pPr marL="0" indent="0">
+              <a:lnSpc>
+                <a:spcPct val="100000"/>
+              </a:lnSpc>
+              <a:buNone/>
+            </a:pPr>
+            <a:endParaRPr lang="pt-BR" sz="2400" dirty="0">
+              <a:latin typeface="Arial" panose="020B0604020202020204" pitchFamily="34" charset="0"/>
+              <a:cs typeface="Arial" panose="020B0604020202020204" pitchFamily="34" charset="0"/>
+            </a:endParaRPr>
+          </a:p>
+        </p:txBody>
+      </p:sp>
+    </p:spTree>
+    <p:extLst>
+      <p:ext uri="{BB962C8B-B14F-4D97-AF65-F5344CB8AC3E}">
+        <p14:creationId xmlns:p14="http://schemas.microsoft.com/office/powerpoint/2010/main" val="312359495"/>
+      </p:ext>
+    </p:extLst>
+  </p:cSld>
+  <p:clrMapOvr>
+    <a:masterClrMapping/>
+  </p:clrMapOvr>
+</p:sld>
+</file>
+
+<file path=ppt/slides/slide26.xml><?xml version="1.0" encoding="utf-8"?>
+<p:sld xmlns:a="http://schemas.openxmlformats.org/drawingml/2006/main" xmlns:r="http://schemas.openxmlformats.org/officeDocument/2006/relationships" xmlns:p="http://schemas.openxmlformats.org/presentationml/2006/main">
+  <p:cSld>
+    <p:spTree>
+      <p:nvGrpSpPr>
+        <p:cNvPr id="1" name=""/>
+        <p:cNvGrpSpPr/>
+        <p:nvPr/>
+      </p:nvGrpSpPr>
+      <p:grpSpPr>
+        <a:xfrm>
+          <a:off x="0" y="0"/>
+          <a:ext cx="0" cy="0"/>
+          <a:chOff x="0" y="0"/>
+          <a:chExt cx="0" cy="0"/>
+        </a:xfrm>
+      </p:grpSpPr>
+      <p:sp>
+        <p:nvSpPr>
+          <p:cNvPr id="2" name="Título 1">
+            <a:extLst>
+              <a:ext uri="{FF2B5EF4-FFF2-40B4-BE49-F238E27FC236}">
+                <a16:creationId xmlns:a16="http://schemas.microsoft.com/office/drawing/2014/main" id="{CE2A4DA7-6518-45B1-9ECD-6F7F91729AB1}"/>
+              </a:ext>
+            </a:extLst>
+          </p:cNvPr>
+          <p:cNvSpPr>
+            <a:spLocks noGrp="1"/>
+          </p:cNvSpPr>
+          <p:nvPr>
+            <p:ph type="title"/>
+          </p:nvPr>
+        </p:nvSpPr>
+        <p:spPr>
+          <a:xfrm>
+            <a:off x="333375" y="365125"/>
+            <a:ext cx="11677649" cy="1325563"/>
+          </a:xfrm>
+        </p:spPr>
+        <p:txBody>
+          <a:bodyPr/>
+          <a:lstStyle/>
+          <a:p>
+            <a:pPr algn="ctr"/>
+            <a:r>
+              <a:rPr lang="pt-BR" dirty="0">
+                <a:latin typeface="Arial" panose="020B0604020202020204" pitchFamily="34" charset="0"/>
+                <a:cs typeface="Arial" panose="020B0604020202020204" pitchFamily="34" charset="0"/>
+              </a:rPr>
+              <a:t>Engenharia de Conhecimento para FOL</a:t>
+            </a:r>
+          </a:p>
+        </p:txBody>
+      </p:sp>
+      <p:sp>
+        <p:nvSpPr>
+          <p:cNvPr id="3" name="Espaço Reservado para Conteúdo 2">
+            <a:extLst>
+              <a:ext uri="{FF2B5EF4-FFF2-40B4-BE49-F238E27FC236}">
+                <a16:creationId xmlns:a16="http://schemas.microsoft.com/office/drawing/2014/main" id="{C6130D9F-B7B8-4641-AD48-2C4E7990BB71}"/>
+              </a:ext>
+            </a:extLst>
+          </p:cNvPr>
+          <p:cNvSpPr>
+            <a:spLocks noGrp="1"/>
+          </p:cNvSpPr>
+          <p:nvPr>
+            <p:ph idx="1"/>
+          </p:nvPr>
+        </p:nvSpPr>
+        <p:spPr>
+          <a:xfrm>
+            <a:off x="715347" y="1838065"/>
+            <a:ext cx="10885714" cy="4351338"/>
+          </a:xfrm>
+        </p:spPr>
+        <p:txBody>
+          <a:bodyPr>
+            <a:normAutofit/>
+          </a:bodyPr>
+          <a:lstStyle/>
+          <a:p>
+            <a:pPr marL="0" indent="0">
+              <a:lnSpc>
+                <a:spcPct val="100000"/>
+              </a:lnSpc>
+              <a:buNone/>
+            </a:pPr>
+            <a:r>
+              <a:rPr lang="pt-BR" sz="2400" b="1" dirty="0">
+                <a:latin typeface="Arial" panose="020B0604020202020204" pitchFamily="34" charset="0"/>
+                <a:cs typeface="Arial" panose="020B0604020202020204" pitchFamily="34" charset="0"/>
+              </a:rPr>
+              <a:t>Processo de Engenharia de Conhecimento</a:t>
+            </a:r>
+          </a:p>
+          <a:p>
+            <a:pPr marL="0" indent="0">
+              <a:lnSpc>
+                <a:spcPct val="100000"/>
+              </a:lnSpc>
+              <a:buNone/>
+            </a:pPr>
+            <a:r>
+              <a:rPr lang="pt-BR" sz="2400" b="1" dirty="0">
+                <a:latin typeface="Arial" panose="020B0604020202020204" pitchFamily="34" charset="0"/>
+                <a:cs typeface="Arial" panose="020B0604020202020204" pitchFamily="34" charset="0"/>
+              </a:rPr>
+              <a:t>	</a:t>
+            </a:r>
+            <a:r>
+              <a:rPr lang="pt-BR" sz="2400" dirty="0">
+                <a:latin typeface="Arial" panose="020B0604020202020204" pitchFamily="34" charset="0"/>
+                <a:cs typeface="Arial" panose="020B0604020202020204" pitchFamily="34" charset="0"/>
+              </a:rPr>
+              <a:t>1. Identificar a Tarefa</a:t>
+            </a:r>
+          </a:p>
+          <a:p>
+            <a:pPr marL="0" indent="0">
+              <a:lnSpc>
+                <a:spcPct val="100000"/>
+              </a:lnSpc>
+              <a:buNone/>
+            </a:pPr>
+            <a:r>
+              <a:rPr lang="pt-BR" sz="2400" dirty="0">
+                <a:latin typeface="Arial" panose="020B0604020202020204" pitchFamily="34" charset="0"/>
+                <a:cs typeface="Arial" panose="020B0604020202020204" pitchFamily="34" charset="0"/>
+              </a:rPr>
+              <a:t>	2. Juntar o conhecimento relevante</a:t>
+            </a:r>
+          </a:p>
+          <a:p>
+            <a:pPr marL="0" indent="0">
+              <a:lnSpc>
+                <a:spcPct val="100000"/>
+              </a:lnSpc>
+              <a:buNone/>
+            </a:pPr>
+            <a:r>
+              <a:rPr lang="pt-BR" sz="2400" dirty="0">
+                <a:latin typeface="Arial" panose="020B0604020202020204" pitchFamily="34" charset="0"/>
+                <a:cs typeface="Arial" panose="020B0604020202020204" pitchFamily="34" charset="0"/>
+              </a:rPr>
+              <a:t>	3. Criar um vocabulário de predicados, funções e constantes</a:t>
+            </a:r>
+          </a:p>
+          <a:p>
+            <a:pPr marL="0" indent="0">
+              <a:lnSpc>
+                <a:spcPct val="100000"/>
+              </a:lnSpc>
+              <a:buNone/>
+            </a:pPr>
+            <a:r>
+              <a:rPr lang="pt-BR" sz="2400" dirty="0">
+                <a:latin typeface="Arial" panose="020B0604020202020204" pitchFamily="34" charset="0"/>
+                <a:cs typeface="Arial" panose="020B0604020202020204" pitchFamily="34" charset="0"/>
+              </a:rPr>
+              <a:t>	4. Codificar o conhecimento geral do domínio</a:t>
+            </a:r>
+          </a:p>
+          <a:p>
+            <a:pPr marL="0" indent="0">
+              <a:lnSpc>
+                <a:spcPct val="100000"/>
+              </a:lnSpc>
+              <a:buNone/>
+            </a:pPr>
+            <a:r>
+              <a:rPr lang="pt-BR" sz="2400" dirty="0">
+                <a:latin typeface="Arial" panose="020B0604020202020204" pitchFamily="34" charset="0"/>
+                <a:cs typeface="Arial" panose="020B0604020202020204" pitchFamily="34" charset="0"/>
+              </a:rPr>
+              <a:t>	5. Codificar uma descrição para uma instância do problema</a:t>
+            </a:r>
+          </a:p>
+          <a:p>
+            <a:pPr marL="0" indent="0">
+              <a:lnSpc>
+                <a:spcPct val="100000"/>
+              </a:lnSpc>
+              <a:buNone/>
+            </a:pPr>
+            <a:r>
+              <a:rPr lang="pt-BR" sz="2400" dirty="0">
+                <a:latin typeface="Arial" panose="020B0604020202020204" pitchFamily="34" charset="0"/>
+                <a:cs typeface="Arial" panose="020B0604020202020204" pitchFamily="34" charset="0"/>
+              </a:rPr>
+              <a:t>	6. Criar buscas (</a:t>
+            </a:r>
+            <a:r>
+              <a:rPr lang="pt-BR" sz="2400" i="1" dirty="0">
+                <a:latin typeface="Arial" panose="020B0604020202020204" pitchFamily="34" charset="0"/>
+                <a:cs typeface="Arial" panose="020B0604020202020204" pitchFamily="34" charset="0"/>
+              </a:rPr>
+              <a:t>queries</a:t>
+            </a:r>
+            <a:r>
+              <a:rPr lang="pt-BR" sz="2400" dirty="0">
+                <a:latin typeface="Arial" panose="020B0604020202020204" pitchFamily="34" charset="0"/>
+                <a:cs typeface="Arial" panose="020B0604020202020204" pitchFamily="34" charset="0"/>
+              </a:rPr>
+              <a:t>) que retornem informações sobre o estado</a:t>
+            </a:r>
+          </a:p>
+          <a:p>
+            <a:pPr marL="0" indent="0">
+              <a:lnSpc>
+                <a:spcPct val="100000"/>
+              </a:lnSpc>
+              <a:buNone/>
+            </a:pPr>
+            <a:r>
+              <a:rPr lang="pt-BR" sz="2400" dirty="0">
+                <a:latin typeface="Arial" panose="020B0604020202020204" pitchFamily="34" charset="0"/>
+                <a:cs typeface="Arial" panose="020B0604020202020204" pitchFamily="34" charset="0"/>
+              </a:rPr>
+              <a:t>	7. Realizar o </a:t>
+            </a:r>
+            <a:r>
+              <a:rPr lang="pt-BR" sz="2400" i="1" dirty="0">
+                <a:latin typeface="Arial" panose="020B0604020202020204" pitchFamily="34" charset="0"/>
+                <a:cs typeface="Arial" panose="020B0604020202020204" pitchFamily="34" charset="0"/>
+              </a:rPr>
+              <a:t>debug </a:t>
+            </a:r>
+            <a:r>
+              <a:rPr lang="pt-BR" sz="2400" dirty="0">
+                <a:latin typeface="Arial" panose="020B0604020202020204" pitchFamily="34" charset="0"/>
+                <a:cs typeface="Arial" panose="020B0604020202020204" pitchFamily="34" charset="0"/>
+              </a:rPr>
+              <a:t>da Base de Conhecimento</a:t>
+            </a:r>
+          </a:p>
+          <a:p>
+            <a:pPr marL="0" indent="0">
+              <a:lnSpc>
+                <a:spcPct val="100000"/>
+              </a:lnSpc>
+              <a:buNone/>
+            </a:pPr>
+            <a:endParaRPr lang="pt-BR" sz="2400" dirty="0">
+              <a:latin typeface="Arial" panose="020B0604020202020204" pitchFamily="34" charset="0"/>
+              <a:cs typeface="Arial" panose="020B0604020202020204" pitchFamily="34" charset="0"/>
+            </a:endParaRPr>
+          </a:p>
+        </p:txBody>
+      </p:sp>
+    </p:spTree>
+    <p:extLst>
+      <p:ext uri="{BB962C8B-B14F-4D97-AF65-F5344CB8AC3E}">
+        <p14:creationId xmlns:p14="http://schemas.microsoft.com/office/powerpoint/2010/main" val="544250599"/>
+      </p:ext>
+    </p:extLst>
+  </p:cSld>
+  <p:clrMapOvr>
+    <a:masterClrMapping/>
+  </p:clrMapOvr>
+</p:sld>
+</file>
+
+<file path=ppt/slides/slide27.xml><?xml version="1.0" encoding="utf-8"?>
+<p:sld xmlns:a="http://schemas.openxmlformats.org/drawingml/2006/main" xmlns:r="http://schemas.openxmlformats.org/officeDocument/2006/relationships" xmlns:p="http://schemas.openxmlformats.org/presentationml/2006/main">
+  <p:cSld>
+    <p:spTree>
+      <p:nvGrpSpPr>
+        <p:cNvPr id="1" name="Shape 99"/>
+        <p:cNvGrpSpPr/>
+        <p:nvPr/>
+      </p:nvGrpSpPr>
+      <p:grpSpPr>
+        <a:xfrm>
+          <a:off x="0" y="0"/>
+          <a:ext cx="0" cy="0"/>
+          <a:chOff x="0" y="0"/>
+          <a:chExt cx="0" cy="0"/>
+        </a:xfrm>
+      </p:grpSpPr>
+      <p:sp>
+        <p:nvSpPr>
+          <p:cNvPr id="100" name="Shape 100"/>
+          <p:cNvSpPr txBox="1">
+            <a:spLocks noGrp="1"/>
+          </p:cNvSpPr>
+          <p:nvPr>
+            <p:ph type="title"/>
+          </p:nvPr>
+        </p:nvSpPr>
+        <p:spPr>
+          <a:xfrm>
+            <a:off x="415600" y="3965856"/>
+            <a:ext cx="11360800" cy="763600"/>
+          </a:xfrm>
+          <a:prstGeom prst="rect">
+            <a:avLst/>
+          </a:prstGeom>
+        </p:spPr>
+        <p:txBody>
+          <a:bodyPr spcFirstLastPara="1" vert="horz" wrap="square" lIns="121900" tIns="121900" rIns="121900" bIns="121900" rtlCol="0" anchor="t" anchorCtr="0">
+            <a:noAutofit/>
+          </a:bodyPr>
+          <a:lstStyle/>
+          <a:p>
+            <a:pPr algn="ctr"/>
+            <a:r>
+              <a:rPr lang="pt-BR" sz="2667" b="1" dirty="0"/>
+              <a:t>Agradecimentos</a:t>
+            </a:r>
+            <a:endParaRPr sz="2667" b="1" dirty="0"/>
+          </a:p>
+        </p:txBody>
+      </p:sp>
+      <p:sp>
+        <p:nvSpPr>
+          <p:cNvPr id="3" name="Espaço Reservado para Conteúdo 2">
+            <a:extLst>
+              <a:ext uri="{FF2B5EF4-FFF2-40B4-BE49-F238E27FC236}">
+                <a16:creationId xmlns:a16="http://schemas.microsoft.com/office/drawing/2014/main" id="{C54A67CD-C08B-447E-9285-B4EF0E687F1A}"/>
+              </a:ext>
+            </a:extLst>
+          </p:cNvPr>
+          <p:cNvSpPr txBox="1">
+            <a:spLocks/>
+          </p:cNvSpPr>
+          <p:nvPr/>
+        </p:nvSpPr>
+        <p:spPr>
+          <a:xfrm>
+            <a:off x="609600" y="2024024"/>
+            <a:ext cx="10972800" cy="1373875"/>
+          </a:xfrm>
+          <a:prstGeom prst="rect">
+            <a:avLst/>
+          </a:prstGeom>
+          <a:noFill/>
+          <a:ln>
+            <a:noFill/>
+          </a:ln>
+        </p:spPr>
+        <p:txBody>
+          <a:bodyPr spcFirstLastPara="1" wrap="square" lIns="121900" tIns="121900" rIns="121900" bIns="121900" anchor="t" anchorCtr="0"/>
+          <a:lstStyle>
+            <a:defPPr marR="0" lvl="0" algn="l" rtl="0">
+              <a:lnSpc>
+                <a:spcPct val="100000"/>
+              </a:lnSpc>
+              <a:spcBef>
+                <a:spcPts val="0"/>
+              </a:spcBef>
+              <a:spcAft>
+                <a:spcPts val="0"/>
+              </a:spcAft>
+            </a:defPPr>
+            <a:lvl1pPr marL="457200" marR="0" lvl="0" indent="-342900" algn="l" rtl="0">
+              <a:lnSpc>
+                <a:spcPct val="115000"/>
+              </a:lnSpc>
+              <a:spcBef>
+                <a:spcPts val="0"/>
+              </a:spcBef>
+              <a:spcAft>
+                <a:spcPts val="0"/>
+              </a:spcAft>
+              <a:buClr>
+                <a:schemeClr val="dk2"/>
+              </a:buClr>
+              <a:buSzPts val="1800"/>
+              <a:buFont typeface="Arial"/>
+              <a:buChar char="●"/>
+              <a:defRPr sz="1800" b="0" i="0" u="none" strike="noStrike" cap="none">
+                <a:solidFill>
+                  <a:schemeClr val="dk2"/>
+                </a:solidFill>
+                <a:latin typeface="Arial"/>
+                <a:ea typeface="Arial"/>
+                <a:cs typeface="Arial"/>
+                <a:sym typeface="Arial"/>
+              </a:defRPr>
+            </a:lvl1pPr>
+            <a:lvl2pPr marL="914400" marR="0" lvl="1" indent="-317500" algn="l" rtl="0">
+              <a:lnSpc>
+                <a:spcPct val="115000"/>
+              </a:lnSpc>
+              <a:spcBef>
+                <a:spcPts val="1600"/>
+              </a:spcBef>
+              <a:spcAft>
+                <a:spcPts val="0"/>
+              </a:spcAft>
+              <a:buClr>
+                <a:schemeClr val="dk2"/>
+              </a:buClr>
+              <a:buSzPts val="1400"/>
+              <a:buFont typeface="Arial"/>
+              <a:buChar char="○"/>
+              <a:defRPr sz="1400" b="0" i="0" u="none" strike="noStrike" cap="none">
+                <a:solidFill>
+                  <a:schemeClr val="dk2"/>
+                </a:solidFill>
+                <a:latin typeface="Arial"/>
+                <a:ea typeface="Arial"/>
+                <a:cs typeface="Arial"/>
+                <a:sym typeface="Arial"/>
+              </a:defRPr>
+            </a:lvl2pPr>
+            <a:lvl3pPr marL="1371600" marR="0" lvl="2" indent="-317500" algn="l" rtl="0">
+              <a:lnSpc>
+                <a:spcPct val="115000"/>
+              </a:lnSpc>
+              <a:spcBef>
+                <a:spcPts val="1600"/>
+              </a:spcBef>
+              <a:spcAft>
+                <a:spcPts val="0"/>
+              </a:spcAft>
+              <a:buClr>
+                <a:schemeClr val="dk2"/>
+              </a:buClr>
+              <a:buSzPts val="1400"/>
+              <a:buFont typeface="Arial"/>
+              <a:buChar char="■"/>
+              <a:defRPr sz="1400" b="0" i="0" u="none" strike="noStrike" cap="none">
+                <a:solidFill>
+                  <a:schemeClr val="dk2"/>
+                </a:solidFill>
+                <a:latin typeface="Arial"/>
+                <a:ea typeface="Arial"/>
+                <a:cs typeface="Arial"/>
+                <a:sym typeface="Arial"/>
+              </a:defRPr>
+            </a:lvl3pPr>
+            <a:lvl4pPr marL="1828800" marR="0" lvl="3" indent="-317500" algn="l" rtl="0">
+              <a:lnSpc>
+                <a:spcPct val="115000"/>
+              </a:lnSpc>
+              <a:spcBef>
+                <a:spcPts val="1600"/>
+              </a:spcBef>
+              <a:spcAft>
+                <a:spcPts val="0"/>
+              </a:spcAft>
+              <a:buClr>
+                <a:schemeClr val="dk2"/>
+              </a:buClr>
+              <a:buSzPts val="1400"/>
+              <a:buFont typeface="Arial"/>
+              <a:buChar char="●"/>
+              <a:defRPr sz="1400" b="0" i="0" u="none" strike="noStrike" cap="none">
+                <a:solidFill>
+                  <a:schemeClr val="dk2"/>
+                </a:solidFill>
+                <a:latin typeface="Arial"/>
+                <a:ea typeface="Arial"/>
+                <a:cs typeface="Arial"/>
+                <a:sym typeface="Arial"/>
+              </a:defRPr>
+            </a:lvl4pPr>
+            <a:lvl5pPr marL="2286000" marR="0" lvl="4" indent="-317500" algn="l" rtl="0">
+              <a:lnSpc>
+                <a:spcPct val="115000"/>
+              </a:lnSpc>
+              <a:spcBef>
+                <a:spcPts val="1600"/>
+              </a:spcBef>
+              <a:spcAft>
+                <a:spcPts val="0"/>
+              </a:spcAft>
+              <a:buClr>
+                <a:schemeClr val="dk2"/>
+              </a:buClr>
+              <a:buSzPts val="1400"/>
+              <a:buFont typeface="Arial"/>
+              <a:buChar char="○"/>
+              <a:defRPr sz="1400" b="0" i="0" u="none" strike="noStrike" cap="none">
+                <a:solidFill>
+                  <a:schemeClr val="dk2"/>
+                </a:solidFill>
+                <a:latin typeface="Arial"/>
+                <a:ea typeface="Arial"/>
+                <a:cs typeface="Arial"/>
+                <a:sym typeface="Arial"/>
+              </a:defRPr>
+            </a:lvl5pPr>
+            <a:lvl6pPr marL="2743200" marR="0" lvl="5" indent="-317500" algn="l" rtl="0">
+              <a:lnSpc>
+                <a:spcPct val="115000"/>
+              </a:lnSpc>
+              <a:spcBef>
+                <a:spcPts val="1600"/>
+              </a:spcBef>
+              <a:spcAft>
+                <a:spcPts val="0"/>
+              </a:spcAft>
+              <a:buClr>
+                <a:schemeClr val="dk2"/>
+              </a:buClr>
+              <a:buSzPts val="1400"/>
+              <a:buFont typeface="Arial"/>
+              <a:buChar char="■"/>
+              <a:defRPr sz="1400" b="0" i="0" u="none" strike="noStrike" cap="none">
+                <a:solidFill>
+                  <a:schemeClr val="dk2"/>
+                </a:solidFill>
+                <a:latin typeface="Arial"/>
+                <a:ea typeface="Arial"/>
+                <a:cs typeface="Arial"/>
+                <a:sym typeface="Arial"/>
+              </a:defRPr>
+            </a:lvl6pPr>
+            <a:lvl7pPr marL="3200400" marR="0" lvl="6" indent="-317500" algn="l" rtl="0">
+              <a:lnSpc>
+                <a:spcPct val="115000"/>
+              </a:lnSpc>
+              <a:spcBef>
+                <a:spcPts val="1600"/>
+              </a:spcBef>
+              <a:spcAft>
+                <a:spcPts val="0"/>
+              </a:spcAft>
+              <a:buClr>
+                <a:schemeClr val="dk2"/>
+              </a:buClr>
+              <a:buSzPts val="1400"/>
+              <a:buFont typeface="Arial"/>
+              <a:buChar char="●"/>
+              <a:defRPr sz="1400" b="0" i="0" u="none" strike="noStrike" cap="none">
+                <a:solidFill>
+                  <a:schemeClr val="dk2"/>
+                </a:solidFill>
+                <a:latin typeface="Arial"/>
+                <a:ea typeface="Arial"/>
+                <a:cs typeface="Arial"/>
+                <a:sym typeface="Arial"/>
+              </a:defRPr>
+            </a:lvl7pPr>
+            <a:lvl8pPr marL="3657600" marR="0" lvl="7" indent="-317500" algn="l" rtl="0">
+              <a:lnSpc>
+                <a:spcPct val="115000"/>
+              </a:lnSpc>
+              <a:spcBef>
+                <a:spcPts val="1600"/>
+              </a:spcBef>
+              <a:spcAft>
+                <a:spcPts val="0"/>
+              </a:spcAft>
+              <a:buClr>
+                <a:schemeClr val="dk2"/>
+              </a:buClr>
+              <a:buSzPts val="1400"/>
+              <a:buFont typeface="Arial"/>
+              <a:buChar char="○"/>
+              <a:defRPr sz="1400" b="0" i="0" u="none" strike="noStrike" cap="none">
+                <a:solidFill>
+                  <a:schemeClr val="dk2"/>
+                </a:solidFill>
+                <a:latin typeface="Arial"/>
+                <a:ea typeface="Arial"/>
+                <a:cs typeface="Arial"/>
+                <a:sym typeface="Arial"/>
+              </a:defRPr>
+            </a:lvl8pPr>
+            <a:lvl9pPr marL="4114800" marR="0" lvl="8" indent="-317500" algn="l" rtl="0">
+              <a:lnSpc>
+                <a:spcPct val="115000"/>
+              </a:lnSpc>
+              <a:spcBef>
+                <a:spcPts val="1600"/>
+              </a:spcBef>
+              <a:spcAft>
+                <a:spcPts val="1600"/>
+              </a:spcAft>
+              <a:buClr>
+                <a:schemeClr val="dk2"/>
+              </a:buClr>
+              <a:buSzPts val="1400"/>
+              <a:buFont typeface="Arial"/>
+              <a:buChar char="■"/>
+              <a:defRPr sz="1400" b="0" i="0" u="none" strike="noStrike" cap="none">
+                <a:solidFill>
+                  <a:schemeClr val="dk2"/>
+                </a:solidFill>
+                <a:latin typeface="Arial"/>
+                <a:ea typeface="Arial"/>
+                <a:cs typeface="Arial"/>
+                <a:sym typeface="Arial"/>
+              </a:defRPr>
+            </a:lvl9pPr>
+          </a:lstStyle>
+          <a:p>
+            <a:pPr marL="0" indent="0" algn="ctr">
+              <a:buNone/>
+            </a:pPr>
+            <a:r>
+              <a:rPr lang="pt-BR" altLang="pt-BR" sz="3733" dirty="0">
+                <a:solidFill>
+                  <a:schemeClr val="tx1"/>
+                </a:solidFill>
+                <a:latin typeface="Arial" panose="020B0604020202020204" pitchFamily="34" charset="0"/>
+                <a:cs typeface="Arial" panose="020B0604020202020204" pitchFamily="34" charset="0"/>
+              </a:rPr>
+              <a:t>Vitor Bruno de Oliveira Barth</a:t>
+            </a:r>
+          </a:p>
+          <a:p>
+            <a:pPr marL="0" indent="0" algn="ctr">
+              <a:buNone/>
+            </a:pPr>
+            <a:r>
+              <a:rPr lang="pt-BR" altLang="pt-BR" sz="2667" dirty="0">
+                <a:latin typeface="Arial" panose="020B0604020202020204" pitchFamily="34" charset="0"/>
+                <a:cs typeface="Arial" panose="020B0604020202020204" pitchFamily="34" charset="0"/>
+              </a:rPr>
+              <a:t>vitor.barth@gmail.com</a:t>
+            </a:r>
+          </a:p>
+          <a:p>
+            <a:pPr marL="0" indent="0" algn="ctr">
+              <a:buNone/>
+            </a:pPr>
+            <a:endParaRPr lang="pt-BR" altLang="pt-BR" sz="3733" dirty="0">
+              <a:latin typeface="Arial" panose="020B0604020202020204" pitchFamily="34" charset="0"/>
+              <a:cs typeface="Arial" panose="020B0604020202020204" pitchFamily="34" charset="0"/>
+            </a:endParaRPr>
+          </a:p>
+        </p:txBody>
+      </p:sp>
+      <p:pic>
+        <p:nvPicPr>
+          <p:cNvPr id="4" name="Imagem 7">
+            <a:extLst>
+              <a:ext uri="{FF2B5EF4-FFF2-40B4-BE49-F238E27FC236}">
+                <a16:creationId xmlns:a16="http://schemas.microsoft.com/office/drawing/2014/main" id="{53AA4A1A-FE7F-4457-9871-2538E0732CC4}"/>
+              </a:ext>
+            </a:extLst>
+          </p:cNvPr>
+          <p:cNvPicPr>
+            <a:picLocks noChangeAspect="1"/>
+          </p:cNvPicPr>
+          <p:nvPr/>
+        </p:nvPicPr>
+        <p:blipFill>
+          <a:blip r:embed="rId3">
+            <a:clrChange>
+              <a:clrFrom>
+                <a:srgbClr val="FFFFFF"/>
+              </a:clrFrom>
+              <a:clrTo>
+                <a:srgbClr val="FFFFFF">
+                  <a:alpha val="0"/>
+                </a:srgbClr>
+              </a:clrTo>
+            </a:clrChange>
+            <a:extLst>
+              <a:ext uri="{28A0092B-C50C-407E-A947-70E740481C1C}">
+                <a14:useLocalDpi xmlns:a14="http://schemas.microsoft.com/office/drawing/2010/main" val="0"/>
+              </a:ext>
+            </a:extLst>
+          </a:blip>
+          <a:srcRect/>
+          <a:stretch>
+            <a:fillRect/>
+          </a:stretch>
+        </p:blipFill>
+        <p:spPr bwMode="auto">
+          <a:xfrm>
+            <a:off x="5147734" y="4548273"/>
+            <a:ext cx="1896533" cy="2197100"/>
+          </a:xfrm>
+          <a:prstGeom prst="rect">
+            <a:avLst/>
+          </a:prstGeom>
+          <a:noFill/>
+          <a:ln>
+            <a:noFill/>
+          </a:ln>
+          <a:extLst>
+            <a:ext uri="{909E8E84-426E-40DD-AFC4-6F175D3DCCD1}">
+              <a14:hiddenFill xmlns:a14="http://schemas.microsoft.com/office/drawing/2010/main">
+                <a:solidFill>
+                  <a:srgbClr val="FFFFFF"/>
+                </a:solidFill>
+              </a14:hiddenFill>
+            </a:ext>
+            <a:ext uri="{91240B29-F687-4F45-9708-019B960494DF}">
+              <a14:hiddenLine xmlns:a14="http://schemas.microsoft.com/office/drawing/2010/main" w="9525">
+                <a:solidFill>
+                  <a:srgbClr val="000000"/>
+                </a:solidFill>
+                <a:miter lim="800000"/>
+                <a:headEnd/>
+                <a:tailEnd/>
+              </a14:hiddenLine>
+            </a:ext>
+          </a:extLst>
+        </p:spPr>
+      </p:pic>
+      <p:sp>
+        <p:nvSpPr>
+          <p:cNvPr id="5" name="Título 1">
+            <a:extLst>
+              <a:ext uri="{FF2B5EF4-FFF2-40B4-BE49-F238E27FC236}">
+                <a16:creationId xmlns:a16="http://schemas.microsoft.com/office/drawing/2014/main" id="{613D6FF6-3043-46C0-9632-363E7156CABA}"/>
+              </a:ext>
+            </a:extLst>
+          </p:cNvPr>
+          <p:cNvSpPr txBox="1">
+            <a:spLocks/>
+          </p:cNvSpPr>
+          <p:nvPr/>
+        </p:nvSpPr>
+        <p:spPr>
+          <a:xfrm>
+            <a:off x="609600" y="280695"/>
+            <a:ext cx="10972800" cy="1847851"/>
+          </a:xfrm>
+          <a:prstGeom prst="rect">
+            <a:avLst/>
+          </a:prstGeom>
+          <a:noFill/>
+          <a:ln>
+            <a:noFill/>
+          </a:ln>
+        </p:spPr>
+        <p:txBody>
+          <a:bodyPr spcFirstLastPara="1" wrap="square" lIns="121900" tIns="121900" rIns="121900" bIns="121900" anchor="t" anchorCtr="0"/>
+          <a:lstStyle>
+            <a:defPPr marR="0" lvl="0" algn="l" rtl="0">
+              <a:lnSpc>
+                <a:spcPct val="100000"/>
+              </a:lnSpc>
+              <a:spcBef>
+                <a:spcPts val="0"/>
+              </a:spcBef>
+              <a:spcAft>
+                <a:spcPts val="0"/>
+              </a:spcAft>
+            </a:defPPr>
+            <a:lvl1pPr marR="0" lvl="0" algn="l" rtl="0">
+              <a:lnSpc>
+                <a:spcPct val="100000"/>
+              </a:lnSpc>
+              <a:spcBef>
+                <a:spcPts val="0"/>
+              </a:spcBef>
+              <a:spcAft>
+                <a:spcPts val="0"/>
+              </a:spcAft>
+              <a:buClr>
+                <a:schemeClr val="dk1"/>
+              </a:buClr>
+              <a:buSzPts val="2800"/>
+              <a:buFont typeface="Arial"/>
+              <a:buNone/>
+              <a:defRPr sz="2800" b="0" i="0" u="none" strike="noStrike" cap="none">
+                <a:solidFill>
+                  <a:schemeClr val="dk1"/>
+                </a:solidFill>
+                <a:latin typeface="Arial"/>
+                <a:ea typeface="Arial"/>
+                <a:cs typeface="Arial"/>
+                <a:sym typeface="Arial"/>
+              </a:defRPr>
+            </a:lvl1pPr>
+            <a:lvl2pPr marR="0" lvl="1" algn="l" rtl="0">
+              <a:lnSpc>
+                <a:spcPct val="100000"/>
+              </a:lnSpc>
+              <a:spcBef>
+                <a:spcPts val="0"/>
+              </a:spcBef>
+              <a:spcAft>
+                <a:spcPts val="0"/>
+              </a:spcAft>
+              <a:buClr>
+                <a:schemeClr val="dk1"/>
+              </a:buClr>
+              <a:buSzPts val="2800"/>
+              <a:buFont typeface="Arial"/>
+              <a:buNone/>
+              <a:defRPr sz="2800" b="0" i="0" u="none" strike="noStrike" cap="none">
+                <a:solidFill>
+                  <a:schemeClr val="dk1"/>
+                </a:solidFill>
+                <a:latin typeface="Arial"/>
+                <a:ea typeface="Arial"/>
+                <a:cs typeface="Arial"/>
+                <a:sym typeface="Arial"/>
+              </a:defRPr>
+            </a:lvl2pPr>
+            <a:lvl3pPr marR="0" lvl="2" algn="l" rtl="0">
+              <a:lnSpc>
+                <a:spcPct val="100000"/>
+              </a:lnSpc>
+              <a:spcBef>
+                <a:spcPts val="0"/>
+              </a:spcBef>
+              <a:spcAft>
+                <a:spcPts val="0"/>
+              </a:spcAft>
+              <a:buClr>
+                <a:schemeClr val="dk1"/>
+              </a:buClr>
+              <a:buSzPts val="2800"/>
+              <a:buFont typeface="Arial"/>
+              <a:buNone/>
+              <a:defRPr sz="2800" b="0" i="0" u="none" strike="noStrike" cap="none">
+                <a:solidFill>
+                  <a:schemeClr val="dk1"/>
+                </a:solidFill>
+                <a:latin typeface="Arial"/>
+                <a:ea typeface="Arial"/>
+                <a:cs typeface="Arial"/>
+                <a:sym typeface="Arial"/>
+              </a:defRPr>
+            </a:lvl3pPr>
+            <a:lvl4pPr marR="0" lvl="3" algn="l" rtl="0">
+              <a:lnSpc>
+                <a:spcPct val="100000"/>
+              </a:lnSpc>
+              <a:spcBef>
+                <a:spcPts val="0"/>
+              </a:spcBef>
+              <a:spcAft>
+                <a:spcPts val="0"/>
+              </a:spcAft>
+              <a:buClr>
+                <a:schemeClr val="dk1"/>
+              </a:buClr>
+              <a:buSzPts val="2800"/>
+              <a:buFont typeface="Arial"/>
+              <a:buNone/>
+              <a:defRPr sz="2800" b="0" i="0" u="none" strike="noStrike" cap="none">
+                <a:solidFill>
+                  <a:schemeClr val="dk1"/>
+                </a:solidFill>
+                <a:latin typeface="Arial"/>
+                <a:ea typeface="Arial"/>
+                <a:cs typeface="Arial"/>
+                <a:sym typeface="Arial"/>
+              </a:defRPr>
+            </a:lvl4pPr>
+            <a:lvl5pPr marR="0" lvl="4" algn="l" rtl="0">
+              <a:lnSpc>
+                <a:spcPct val="100000"/>
+              </a:lnSpc>
+              <a:spcBef>
+                <a:spcPts val="0"/>
+              </a:spcBef>
+              <a:spcAft>
+                <a:spcPts val="0"/>
+              </a:spcAft>
+              <a:buClr>
+                <a:schemeClr val="dk1"/>
+              </a:buClr>
+              <a:buSzPts val="2800"/>
+              <a:buFont typeface="Arial"/>
+              <a:buNone/>
+              <a:defRPr sz="2800" b="0" i="0" u="none" strike="noStrike" cap="none">
+                <a:solidFill>
+                  <a:schemeClr val="dk1"/>
+                </a:solidFill>
+                <a:latin typeface="Arial"/>
+                <a:ea typeface="Arial"/>
+                <a:cs typeface="Arial"/>
+                <a:sym typeface="Arial"/>
+              </a:defRPr>
+            </a:lvl5pPr>
+            <a:lvl6pPr marR="0" lvl="5" algn="l" rtl="0">
+              <a:lnSpc>
+                <a:spcPct val="100000"/>
+              </a:lnSpc>
+              <a:spcBef>
+                <a:spcPts val="0"/>
+              </a:spcBef>
+              <a:spcAft>
+                <a:spcPts val="0"/>
+              </a:spcAft>
+              <a:buClr>
+                <a:schemeClr val="dk1"/>
+              </a:buClr>
+              <a:buSzPts val="2800"/>
+              <a:buFont typeface="Arial"/>
+              <a:buNone/>
+              <a:defRPr sz="2800" b="0" i="0" u="none" strike="noStrike" cap="none">
+                <a:solidFill>
+                  <a:schemeClr val="dk1"/>
+                </a:solidFill>
+                <a:latin typeface="Arial"/>
+                <a:ea typeface="Arial"/>
+                <a:cs typeface="Arial"/>
+                <a:sym typeface="Arial"/>
+              </a:defRPr>
+            </a:lvl6pPr>
+            <a:lvl7pPr marR="0" lvl="6" algn="l" rtl="0">
+              <a:lnSpc>
+                <a:spcPct val="100000"/>
+              </a:lnSpc>
+              <a:spcBef>
+                <a:spcPts val="0"/>
+              </a:spcBef>
+              <a:spcAft>
+                <a:spcPts val="0"/>
+              </a:spcAft>
+              <a:buClr>
+                <a:schemeClr val="dk1"/>
+              </a:buClr>
+              <a:buSzPts val="2800"/>
+              <a:buFont typeface="Arial"/>
+              <a:buNone/>
+              <a:defRPr sz="2800" b="0" i="0" u="none" strike="noStrike" cap="none">
+                <a:solidFill>
+                  <a:schemeClr val="dk1"/>
+                </a:solidFill>
+                <a:latin typeface="Arial"/>
+                <a:ea typeface="Arial"/>
+                <a:cs typeface="Arial"/>
+                <a:sym typeface="Arial"/>
+              </a:defRPr>
+            </a:lvl7pPr>
+            <a:lvl8pPr marR="0" lvl="7" algn="l" rtl="0">
+              <a:lnSpc>
+                <a:spcPct val="100000"/>
+              </a:lnSpc>
+              <a:spcBef>
+                <a:spcPts val="0"/>
+              </a:spcBef>
+              <a:spcAft>
+                <a:spcPts val="0"/>
+              </a:spcAft>
+              <a:buClr>
+                <a:schemeClr val="dk1"/>
+              </a:buClr>
+              <a:buSzPts val="2800"/>
+              <a:buFont typeface="Arial"/>
+              <a:buNone/>
+              <a:defRPr sz="2800" b="0" i="0" u="none" strike="noStrike" cap="none">
+                <a:solidFill>
+                  <a:schemeClr val="dk1"/>
+                </a:solidFill>
+                <a:latin typeface="Arial"/>
+                <a:ea typeface="Arial"/>
+                <a:cs typeface="Arial"/>
+                <a:sym typeface="Arial"/>
+              </a:defRPr>
+            </a:lvl8pPr>
+            <a:lvl9pPr marR="0" lvl="8" algn="l" rtl="0">
+              <a:lnSpc>
+                <a:spcPct val="100000"/>
+              </a:lnSpc>
+              <a:spcBef>
+                <a:spcPts val="0"/>
+              </a:spcBef>
+              <a:spcAft>
+                <a:spcPts val="0"/>
+              </a:spcAft>
+              <a:buClr>
+                <a:schemeClr val="dk1"/>
+              </a:buClr>
+              <a:buSzPts val="2800"/>
+              <a:buFont typeface="Arial"/>
+              <a:buNone/>
+              <a:defRPr sz="2800" b="0" i="0" u="none" strike="noStrike" cap="none">
+                <a:solidFill>
+                  <a:schemeClr val="dk1"/>
+                </a:solidFill>
+                <a:latin typeface="Arial"/>
+                <a:ea typeface="Arial"/>
+                <a:cs typeface="Arial"/>
+                <a:sym typeface="Arial"/>
+              </a:defRPr>
+            </a:lvl9pPr>
+          </a:lstStyle>
+          <a:p>
+            <a:pPr algn="ctr"/>
+            <a:r>
+              <a:rPr lang="pt-BR" altLang="pt-BR" sz="5333" b="1">
+                <a:solidFill>
+                  <a:schemeClr val="tx1"/>
+                </a:solidFill>
+                <a:latin typeface="Arial" panose="020B0604020202020204" pitchFamily="34" charset="0"/>
+                <a:cs typeface="Arial" panose="020B0604020202020204" pitchFamily="34" charset="0"/>
+              </a:rPr>
+              <a:t>Obrigado!</a:t>
+            </a:r>
+            <a:endParaRPr lang="pt-BR" altLang="pt-BR" sz="5333" b="1" dirty="0">
+              <a:solidFill>
+                <a:schemeClr val="tx1"/>
+              </a:solidFill>
+              <a:latin typeface="Arial" panose="020B0604020202020204" pitchFamily="34" charset="0"/>
+              <a:cs typeface="Arial" panose="020B0604020202020204" pitchFamily="34" charset="0"/>
+            </a:endParaRPr>
+          </a:p>
+        </p:txBody>
+      </p:sp>
+    </p:spTree>
+    <p:extLst>
+      <p:ext uri="{BB962C8B-B14F-4D97-AF65-F5344CB8AC3E}">
+        <p14:creationId xmlns:p14="http://schemas.microsoft.com/office/powerpoint/2010/main" val="1163950094"/>
       </p:ext>
     </p:extLst>
   </p:cSld>

</xml_diff>